<commit_message>
compression part done, starting querying part
</commit_message>
<xml_diff>
--- a/presentation/presentation_RCura.pptx
+++ b/presentation/presentation_RCura.pptx
@@ -5,10 +5,10 @@
     <p:sldMasterId id="2147483648" r:id="rId1"/>
   </p:sldMasterIdLst>
   <p:notesMasterIdLst>
-    <p:notesMasterId r:id="rId46"/>
+    <p:notesMasterId r:id="rId47"/>
   </p:notesMasterIdLst>
   <p:handoutMasterIdLst>
-    <p:handoutMasterId r:id="rId47"/>
+    <p:handoutMasterId r:id="rId48"/>
   </p:handoutMasterIdLst>
   <p:sldIdLst>
     <p:sldId id="256" r:id="rId2"/>
@@ -29,32 +29,33 @@
     <p:sldId id="299" r:id="rId17"/>
     <p:sldId id="300" r:id="rId18"/>
     <p:sldId id="301" r:id="rId19"/>
-    <p:sldId id="302" r:id="rId20"/>
-    <p:sldId id="303" r:id="rId21"/>
-    <p:sldId id="283" r:id="rId22"/>
-    <p:sldId id="278" r:id="rId23"/>
-    <p:sldId id="279" r:id="rId24"/>
-    <p:sldId id="285" r:id="rId25"/>
-    <p:sldId id="286" r:id="rId26"/>
-    <p:sldId id="296" r:id="rId27"/>
-    <p:sldId id="297" r:id="rId28"/>
-    <p:sldId id="258" r:id="rId29"/>
-    <p:sldId id="259" r:id="rId30"/>
-    <p:sldId id="260" r:id="rId31"/>
-    <p:sldId id="261" r:id="rId32"/>
-    <p:sldId id="262" r:id="rId33"/>
-    <p:sldId id="263" r:id="rId34"/>
-    <p:sldId id="264" r:id="rId35"/>
-    <p:sldId id="265" r:id="rId36"/>
-    <p:sldId id="266" r:id="rId37"/>
-    <p:sldId id="267" r:id="rId38"/>
-    <p:sldId id="268" r:id="rId39"/>
-    <p:sldId id="269" r:id="rId40"/>
-    <p:sldId id="270" r:id="rId41"/>
-    <p:sldId id="271" r:id="rId42"/>
-    <p:sldId id="272" r:id="rId43"/>
-    <p:sldId id="273" r:id="rId44"/>
-    <p:sldId id="274" r:id="rId45"/>
+    <p:sldId id="304" r:id="rId20"/>
+    <p:sldId id="302" r:id="rId21"/>
+    <p:sldId id="303" r:id="rId22"/>
+    <p:sldId id="283" r:id="rId23"/>
+    <p:sldId id="278" r:id="rId24"/>
+    <p:sldId id="279" r:id="rId25"/>
+    <p:sldId id="285" r:id="rId26"/>
+    <p:sldId id="286" r:id="rId27"/>
+    <p:sldId id="296" r:id="rId28"/>
+    <p:sldId id="297" r:id="rId29"/>
+    <p:sldId id="258" r:id="rId30"/>
+    <p:sldId id="259" r:id="rId31"/>
+    <p:sldId id="260" r:id="rId32"/>
+    <p:sldId id="261" r:id="rId33"/>
+    <p:sldId id="262" r:id="rId34"/>
+    <p:sldId id="263" r:id="rId35"/>
+    <p:sldId id="264" r:id="rId36"/>
+    <p:sldId id="265" r:id="rId37"/>
+    <p:sldId id="266" r:id="rId38"/>
+    <p:sldId id="267" r:id="rId39"/>
+    <p:sldId id="268" r:id="rId40"/>
+    <p:sldId id="269" r:id="rId41"/>
+    <p:sldId id="270" r:id="rId42"/>
+    <p:sldId id="271" r:id="rId43"/>
+    <p:sldId id="272" r:id="rId44"/>
+    <p:sldId id="273" r:id="rId45"/>
+    <p:sldId id="274" r:id="rId46"/>
   </p:sldIdLst>
   <p:sldSz cx="9144000" cy="6858000" type="screen4x3"/>
   <p:notesSz cx="9867900" cy="6743700"/>
@@ -5782,7 +5783,7 @@
         </p:spPr>
         <p:txBody>
           <a:bodyPr>
-            <a:normAutofit/>
+            <a:normAutofit fontScale="92500" lnSpcReduction="10000"/>
           </a:bodyPr>
           <a:lstStyle/>
           <a:p>
@@ -5796,20 +5797,32 @@
               <a:rPr lang="en-US" dirty="0" smtClean="0">
                 <a:latin typeface="Arno Pro" pitchFamily="18" charset="0"/>
               </a:rPr>
-              <a:t>Presented at  </a:t>
+              <a:t>Presented at </a:t>
+            </a:r>
+            <a:r>
+              <a:rPr lang="en-US" dirty="0" smtClean="0">
+                <a:latin typeface="Arno Pro" pitchFamily="18" charset="0"/>
+                <a:hlinkClick r:id="rId2"/>
+              </a:rPr>
+              <a:t> </a:t>
             </a:r>
             <a:r>
               <a:rPr lang="en-US" dirty="0" err="1" smtClean="0">
                 <a:latin typeface="Arno Pro" pitchFamily="18" charset="0"/>
+                <a:hlinkClick r:id="rId2"/>
               </a:rPr>
               <a:t>postgresl</a:t>
             </a:r>
             <a:r>
               <a:rPr lang="en-US" dirty="0" smtClean="0">
                 <a:latin typeface="Arno Pro" pitchFamily="18" charset="0"/>
+                <a:hlinkClick r:id="rId2"/>
               </a:rPr>
               <a:t> PARIS session 6. </a:t>
             </a:r>
+            <a:endParaRPr lang="en-US" dirty="0" smtClean="0">
+              <a:latin typeface="Arno Pro" pitchFamily="18" charset="0"/>
+            </a:endParaRPr>
           </a:p>
           <a:p>
             <a:pPr eaLnBrk="1" fontAlgn="auto" hangingPunct="1">
@@ -5818,10 +5831,7 @@
               </a:spcAft>
               <a:defRPr/>
             </a:pPr>
-            <a:r>
-              <a:rPr lang="en-US" sz="1500" dirty="0" smtClean="0"/>
-              <a:t>http://www.oslandia.com/postgresql-session-6-postgis.html</a:t>
-            </a:r>
+            <a:endParaRPr lang="en-US" sz="1500" dirty="0" smtClean="0"/>
           </a:p>
           <a:p>
             <a:pPr eaLnBrk="1" fontAlgn="auto" hangingPunct="1">
@@ -5830,6 +5840,31 @@
               </a:spcAft>
               <a:defRPr/>
             </a:pPr>
+            <a:endParaRPr lang="en-US" dirty="0" smtClean="0">
+              <a:latin typeface="Arno Pro" pitchFamily="18" charset="0"/>
+            </a:endParaRPr>
+          </a:p>
+          <a:p>
+            <a:pPr eaLnBrk="1" fontAlgn="auto" hangingPunct="1">
+              <a:spcAft>
+                <a:spcPts val="0"/>
+              </a:spcAft>
+              <a:defRPr/>
+            </a:pPr>
+            <a:r>
+              <a:rPr lang="en-US" dirty="0" smtClean="0">
+                <a:latin typeface="Arno Pro" pitchFamily="18" charset="0"/>
+                <a:hlinkClick r:id="rId3"/>
+              </a:rPr>
+              <a:t>https://</a:t>
+            </a:r>
+            <a:r>
+              <a:rPr lang="en-US" dirty="0" smtClean="0">
+                <a:latin typeface="Arno Pro" pitchFamily="18" charset="0"/>
+                <a:hlinkClick r:id="rId3"/>
+              </a:rPr>
+              <a:t>github.com/Remi-C/Postgres_Day_2014_10_RemiC</a:t>
+            </a:r>
             <a:endParaRPr lang="en-US" dirty="0" smtClean="0">
               <a:latin typeface="Arno Pro" pitchFamily="18" charset="0"/>
             </a:endParaRPr>
@@ -5966,7 +6001,7 @@
           <p:nvPr/>
         </p:nvPicPr>
         <p:blipFill>
-          <a:blip r:embed="rId2" cstate="print"/>
+          <a:blip r:embed="rId4" cstate="print"/>
           <a:srcRect/>
           <a:stretch>
             <a:fillRect/>
@@ -5992,7 +6027,7 @@
           <p:nvPr/>
         </p:nvPicPr>
         <p:blipFill>
-          <a:blip r:embed="rId3" cstate="print"/>
+          <a:blip r:embed="rId5" cstate="print"/>
           <a:srcRect/>
           <a:stretch>
             <a:fillRect/>
@@ -8326,11 +8361,15 @@
           <a:lstStyle/>
           <a:p>
             <a:r>
-              <a:rPr lang="en-US" cap="small" dirty="0" err="1" smtClean="0"/>
+              <a:rPr lang="en-US" cap="small" dirty="0" err="1" smtClean="0">
+                <a:hlinkClick r:id="rId2"/>
+              </a:rPr>
               <a:t>PointCloud</a:t>
             </a:r>
             <a:r>
-              <a:rPr lang="en-US" cap="small" dirty="0" smtClean="0"/>
+              <a:rPr lang="en-US" cap="small" dirty="0" smtClean="0">
+                <a:hlinkClick r:id="rId2"/>
+              </a:rPr>
               <a:t> </a:t>
             </a:r>
             <a:r>
@@ -10592,14 +10631,131 @@
             </a:r>
           </a:p>
           <a:p>
-            <a:endParaRPr lang="en-US" dirty="0" smtClean="0"/>
-          </a:p>
-          <a:p>
-            <a:r>
-              <a:rPr lang="en-US" dirty="0" smtClean="0"/>
-              <a:t>Talking about compression type</a:t>
-            </a:r>
-            <a:endParaRPr lang="en-US" dirty="0"/>
+            <a:r>
+              <a:rPr lang="en-US" cap="none" dirty="0" smtClean="0"/>
+              <a:t>Why compression is important?</a:t>
+            </a:r>
+          </a:p>
+          <a:p>
+            <a:r>
+              <a:rPr lang="en-US" cap="none" dirty="0" smtClean="0"/>
+              <a:t>An example form image world :</a:t>
+            </a:r>
+          </a:p>
+          <a:p>
+            <a:pPr lvl="1"/>
+            <a:r>
+              <a:rPr lang="en-US" cap="none" dirty="0" smtClean="0"/>
+              <a:t>Full HD Camera : 1920×1080 pixels ×</a:t>
+            </a:r>
+            <a:r>
+              <a:rPr lang="en-US" dirty="0" smtClean="0"/>
+              <a:t> 25images × (1+1+1 octet) /sec</a:t>
+            </a:r>
+            <a:br>
+              <a:rPr lang="en-US" dirty="0" smtClean="0"/>
+            </a:br>
+            <a:r>
+              <a:rPr lang="en-US" dirty="0" smtClean="0"/>
+              <a:t>-&gt; </a:t>
+            </a:r>
+            <a:r>
+              <a:rPr lang="en-US" b="1" dirty="0" smtClean="0"/>
+              <a:t>155 Mo/s</a:t>
+            </a:r>
+          </a:p>
+          <a:p>
+            <a:pPr lvl="1"/>
+            <a:r>
+              <a:rPr lang="en-US" dirty="0" smtClean="0"/>
+              <a:t>Laser : 1 million points * 10 attributes * 2 (doubles) -&gt; </a:t>
+            </a:r>
+            <a:r>
+              <a:rPr lang="en-US" b="1" dirty="0" smtClean="0"/>
+              <a:t>20 Mo/s</a:t>
+            </a:r>
+          </a:p>
+          <a:p>
+            <a:pPr>
+              <a:buNone/>
+            </a:pPr>
+            <a:endParaRPr lang="en-US" cap="none" dirty="0" smtClean="0"/>
+          </a:p>
+          <a:p>
+            <a:pPr>
+              <a:buNone/>
+            </a:pPr>
+            <a:r>
+              <a:rPr lang="en-US" cap="none" dirty="0" smtClean="0"/>
+              <a:t>Yet nobody is speaking of big data regarding video! </a:t>
+            </a:r>
+          </a:p>
+          <a:p>
+            <a:pPr>
+              <a:buNone/>
+            </a:pPr>
+            <a:r>
+              <a:rPr lang="en-US" cap="none" dirty="0" smtClean="0"/>
+              <a:t>	</a:t>
+            </a:r>
+            <a:r>
+              <a:rPr lang="en-US" cap="small" dirty="0" smtClean="0"/>
+              <a:t>WHY?</a:t>
+            </a:r>
+            <a:endParaRPr lang="en-US" cap="small" dirty="0" smtClean="0"/>
+          </a:p>
+          <a:p>
+            <a:pPr>
+              <a:buNone/>
+            </a:pPr>
+            <a:r>
+              <a:rPr lang="en-US" cap="none" dirty="0" smtClean="0"/>
+              <a:t>Because we know very well how to compress images !</a:t>
+            </a:r>
+          </a:p>
+          <a:p>
+            <a:pPr>
+              <a:buNone/>
+            </a:pPr>
+            <a:r>
+              <a:rPr lang="en-US" cap="none" dirty="0" smtClean="0"/>
+              <a:t>Example: standard for professional of video : </a:t>
+            </a:r>
+            <a:r>
+              <a:rPr lang="fr-FR" dirty="0" err="1" smtClean="0"/>
+              <a:t>DNxHD</a:t>
+            </a:r>
+            <a:endParaRPr lang="fr-FR" dirty="0" smtClean="0"/>
+          </a:p>
+          <a:p>
+            <a:pPr lvl="1"/>
+            <a:r>
+              <a:rPr lang="fr-FR" dirty="0" smtClean="0"/>
+              <a:t>Full HD : </a:t>
+            </a:r>
+            <a:r>
+              <a:rPr lang="fr-FR" b="1" dirty="0" smtClean="0"/>
+              <a:t>18 Mo/s</a:t>
+            </a:r>
+            <a:r>
+              <a:rPr lang="fr-FR" dirty="0" smtClean="0"/>
+              <a:t> (1/8) or </a:t>
+            </a:r>
+            <a:r>
+              <a:rPr lang="fr-FR" b="1" dirty="0" smtClean="0"/>
+              <a:t>4.5 Mo/s </a:t>
+            </a:r>
+            <a:r>
+              <a:rPr lang="fr-FR" dirty="0" smtClean="0"/>
+              <a:t>(1/30)</a:t>
+            </a:r>
+            <a:endParaRPr lang="fr-FR" dirty="0" smtClean="0"/>
+          </a:p>
+          <a:p>
+            <a:pPr>
+              <a:buNone/>
+            </a:pPr>
+            <a:endParaRPr lang="en-US" cap="none" dirty="0"/>
           </a:p>
         </p:txBody>
       </p:sp>
@@ -10728,8 +10884,8 @@
         </p:nvSpPr>
         <p:spPr>
           <a:xfrm>
-            <a:off x="0" y="490538"/>
-            <a:ext cx="9144000" cy="561975"/>
+            <a:off x="214282" y="490538"/>
+            <a:ext cx="8929718" cy="561975"/>
           </a:xfrm>
         </p:spPr>
         <p:txBody>
@@ -10758,29 +10914,174 @@
         </p:nvSpPr>
         <p:spPr/>
         <p:txBody>
-          <a:bodyPr/>
-          <a:lstStyle/>
-          <a:p>
-            <a:r>
-              <a:rPr lang="en-US" dirty="0" smtClean="0"/>
-              <a:t>FAST querying</a:t>
-            </a:r>
-          </a:p>
-          <a:p>
+          <a:bodyPr>
+            <a:normAutofit lnSpcReduction="10000"/>
+          </a:bodyPr>
+          <a:lstStyle/>
+          <a:p>
+            <a:r>
+              <a:rPr lang="en-US" dirty="0" smtClean="0"/>
+              <a:t>Efficient storage</a:t>
+            </a:r>
+            <a:endParaRPr lang="en-US" cap="small" dirty="0" smtClean="0"/>
+          </a:p>
+          <a:p>
+            <a:r>
+              <a:rPr lang="en-US" cap="small" dirty="0" err="1" smtClean="0"/>
+              <a:t>PointCloud</a:t>
+            </a:r>
+            <a:r>
+              <a:rPr lang="en-US" cap="small" dirty="0" smtClean="0"/>
+              <a:t> </a:t>
+            </a:r>
+            <a:r>
+              <a:rPr lang="en-US" cap="none" dirty="0" smtClean="0"/>
+              <a:t>can </a:t>
+            </a:r>
+            <a:r>
+              <a:rPr lang="en-US" cap="none" dirty="0" smtClean="0">
+                <a:hlinkClick r:id="rId2"/>
+              </a:rPr>
+              <a:t>compress patches</a:t>
+            </a:r>
+            <a:r>
+              <a:rPr lang="en-US" cap="none" dirty="0" smtClean="0"/>
+              <a:t>.</a:t>
+            </a:r>
+          </a:p>
+          <a:p>
+            <a:pPr lvl="1"/>
+            <a:r>
+              <a:rPr lang="en-US" dirty="0" smtClean="0"/>
+              <a:t>Compression is always about exploiting similarities.</a:t>
+            </a:r>
+          </a:p>
+          <a:p>
+            <a:pPr lvl="1"/>
+            <a:r>
+              <a:rPr lang="en-US" dirty="0" err="1" smtClean="0"/>
+              <a:t>PointCloud</a:t>
+            </a:r>
+            <a:r>
+              <a:rPr lang="en-US" dirty="0" smtClean="0"/>
+              <a:t> compare attribute by attribute for one patch</a:t>
+            </a:r>
+          </a:p>
+          <a:p>
+            <a:pPr lvl="1"/>
+            <a:r>
+              <a:rPr lang="en-US" dirty="0" smtClean="0"/>
+              <a:t>Depending of the similarities, 3 methods are proposed</a:t>
+            </a:r>
+          </a:p>
+          <a:p>
+            <a:pPr lvl="2"/>
+            <a:r>
+              <a:rPr lang="en-US" dirty="0" smtClean="0"/>
+              <a:t>Use bit mask : 10001 ; 10002; 10003 	-&gt; mask=1000, data = 1,2,3</a:t>
+            </a:r>
+          </a:p>
+          <a:p>
+            <a:pPr lvl="2"/>
+            <a:r>
+              <a:rPr lang="en-US" dirty="0" smtClean="0"/>
+              <a:t>Use repetition: 10,10,10,10,10,10,10 	-&gt; repetition=6, data = 10</a:t>
+            </a:r>
+          </a:p>
+          <a:p>
+            <a:pPr lvl="2"/>
+            <a:r>
+              <a:rPr lang="en-US" dirty="0" smtClean="0"/>
+              <a:t>Use </a:t>
+            </a:r>
+            <a:r>
+              <a:rPr lang="en-US" dirty="0" err="1" smtClean="0"/>
+              <a:t>lzip</a:t>
+            </a:r>
+            <a:r>
+              <a:rPr lang="en-US" dirty="0" smtClean="0"/>
+              <a:t> deflate algorithm (dictionary, tree)</a:t>
+            </a:r>
+          </a:p>
+          <a:p>
+            <a:pPr lvl="2"/>
             <a:endParaRPr lang="en-US" dirty="0" smtClean="0"/>
           </a:p>
           <a:p>
-            <a:r>
-              <a:rPr lang="en-US" dirty="0" smtClean="0"/>
-              <a:t>Spatial query</a:t>
-            </a:r>
-          </a:p>
-          <a:p>
-            <a:r>
-              <a:rPr lang="en-US" dirty="0" smtClean="0"/>
-              <a:t>Attribute query</a:t>
-            </a:r>
-            <a:endParaRPr lang="en-US" dirty="0"/>
+            <a:pPr lvl="1"/>
+            <a:r>
+              <a:rPr lang="en-US" dirty="0" smtClean="0"/>
+              <a:t>Example :</a:t>
+            </a:r>
+            <a:endParaRPr lang="en-US" dirty="0" smtClean="0"/>
+          </a:p>
+          <a:p>
+            <a:pPr lvl="1"/>
+            <a:r>
+              <a:rPr lang="en-US" dirty="0" smtClean="0"/>
+              <a:t>For </a:t>
+            </a:r>
+            <a:r>
+              <a:rPr lang="en-US" dirty="0" smtClean="0">
+                <a:hlinkClick r:id="rId3"/>
+              </a:rPr>
+              <a:t>this benchmark data</a:t>
+            </a:r>
+            <a:r>
+              <a:rPr lang="en-US" dirty="0" smtClean="0"/>
+              <a:t> , 12 </a:t>
+            </a:r>
+            <a:r>
+              <a:rPr lang="en-US" sz="1600" dirty="0" smtClean="0"/>
+              <a:t>Million points</a:t>
+            </a:r>
+            <a:r>
+              <a:rPr lang="en-US" dirty="0" smtClean="0"/>
+              <a:t>, binary file on disk </a:t>
+            </a:r>
+            <a:r>
+              <a:rPr lang="en-US" b="1" dirty="0" smtClean="0"/>
+              <a:t>600 Mo</a:t>
+            </a:r>
+          </a:p>
+          <a:p>
+            <a:pPr lvl="2"/>
+            <a:r>
+              <a:rPr lang="en-US" cap="none" dirty="0" smtClean="0"/>
+              <a:t>In database : 25 k patches, (Table=10)</a:t>
+            </a:r>
+            <a:r>
+              <a:rPr lang="en-US" b="1" cap="none" dirty="0" smtClean="0"/>
+              <a:t>+</a:t>
+            </a:r>
+            <a:r>
+              <a:rPr lang="en-US" cap="none" dirty="0" smtClean="0"/>
+              <a:t>(toast=290)</a:t>
+            </a:r>
+            <a:r>
+              <a:rPr lang="en-US" b="1" cap="none" dirty="0" smtClean="0"/>
+              <a:t>+</a:t>
+            </a:r>
+            <a:r>
+              <a:rPr lang="en-US" cap="none" dirty="0" smtClean="0"/>
+              <a:t>(index=5) =</a:t>
+            </a:r>
+            <a:r>
+              <a:rPr lang="en-US" b="1" cap="none" dirty="0" smtClean="0"/>
+              <a:t>305 Mo</a:t>
+            </a:r>
+          </a:p>
+          <a:p>
+            <a:pPr lvl="2"/>
+            <a:r>
+              <a:rPr lang="en-US" dirty="0" smtClean="0"/>
+              <a:t>Binary file zipped on disk : </a:t>
+            </a:r>
+            <a:r>
+              <a:rPr lang="en-US" b="1" dirty="0" smtClean="0"/>
+              <a:t>305Mo</a:t>
+            </a:r>
+            <a:endParaRPr lang="en-US" b="1" cap="none" dirty="0"/>
           </a:p>
         </p:txBody>
       </p:sp>
@@ -11171,22 +11472,24 @@
           <a:p>
             <a:r>
               <a:rPr lang="en-US" dirty="0" smtClean="0"/>
-              <a:t>FAST Loading</a:t>
-            </a:r>
-          </a:p>
-          <a:p>
-            <a:r>
-              <a:rPr lang="en-US" dirty="0" smtClean="0"/>
-              <a:t>Describe the </a:t>
-            </a:r>
-            <a:r>
-              <a:rPr lang="en-US" dirty="0" err="1" smtClean="0"/>
-              <a:t>pointcloud_in_db</a:t>
-            </a:r>
-            <a:r>
-              <a:rPr lang="en-US" dirty="0" smtClean="0"/>
-              <a:t> project</a:t>
-            </a:r>
+              <a:t>FAST querying</a:t>
+            </a:r>
+          </a:p>
+          <a:p>
+            <a:endParaRPr lang="en-US" dirty="0" smtClean="0"/>
+          </a:p>
+          <a:p>
+            <a:r>
+              <a:rPr lang="en-US" dirty="0" smtClean="0"/>
+              <a:t>Spatial query</a:t>
+            </a:r>
+          </a:p>
+          <a:p>
+            <a:r>
+              <a:rPr lang="en-US" dirty="0" smtClean="0"/>
+              <a:t>Attribute query</a:t>
+            </a:r>
+            <a:endParaRPr lang="en-US" dirty="0"/>
           </a:p>
         </p:txBody>
       </p:sp>
@@ -11313,27 +11616,70 @@
             <p:ph type="title"/>
           </p:nvPr>
         </p:nvSpPr>
+        <p:spPr>
+          <a:xfrm>
+            <a:off x="0" y="490538"/>
+            <a:ext cx="9144000" cy="561975"/>
+          </a:xfrm>
+        </p:spPr>
+        <p:txBody>
+          <a:bodyPr>
+            <a:normAutofit fontScale="90000"/>
+          </a:bodyPr>
+          <a:lstStyle/>
+          <a:p>
+            <a:r>
+              <a:rPr lang="en-US" dirty="0" smtClean="0"/>
+              <a:t>efficient  storing/querying/Loading in postgres</a:t>
+            </a:r>
+            <a:endParaRPr lang="en-US" dirty="0"/>
+          </a:p>
+        </p:txBody>
+      </p:sp>
+      <p:sp>
+        <p:nvSpPr>
+          <p:cNvPr id="3" name="Espace réservé du contenu 2"/>
+          <p:cNvSpPr>
+            <a:spLocks noGrp="1"/>
+          </p:cNvSpPr>
+          <p:nvPr>
+            <p:ph idx="1"/>
+          </p:nvPr>
+        </p:nvSpPr>
         <p:spPr/>
         <p:txBody>
           <a:bodyPr/>
           <a:lstStyle/>
           <a:p>
             <a:r>
-              <a:rPr lang="fr-FR" dirty="0" smtClean="0"/>
-              <a:t>ressources</a:t>
-            </a:r>
-            <a:endParaRPr lang="fr-FR" dirty="0"/>
-          </a:p>
-        </p:txBody>
-      </p:sp>
-      <p:sp>
-        <p:nvSpPr>
-          <p:cNvPr id="3" name="Espace réservé du pied de page 2"/>
-          <p:cNvSpPr>
-            <a:spLocks noGrp="1"/>
-          </p:cNvSpPr>
-          <p:nvPr>
-            <p:ph type="ftr" sz="quarter" idx="10"/>
+              <a:rPr lang="en-US" dirty="0" smtClean="0"/>
+              <a:t>FAST Loading</a:t>
+            </a:r>
+          </a:p>
+          <a:p>
+            <a:r>
+              <a:rPr lang="en-US" dirty="0" smtClean="0"/>
+              <a:t>Describe the </a:t>
+            </a:r>
+            <a:r>
+              <a:rPr lang="en-US" dirty="0" err="1" smtClean="0"/>
+              <a:t>pointcloud_in_db</a:t>
+            </a:r>
+            <a:r>
+              <a:rPr lang="en-US" dirty="0" smtClean="0"/>
+              <a:t> project</a:t>
+            </a:r>
+          </a:p>
+        </p:txBody>
+      </p:sp>
+      <p:sp>
+        <p:nvSpPr>
+          <p:cNvPr id="4" name="Espace réservé de la date 3"/>
+          <p:cNvSpPr>
+            <a:spLocks noGrp="1"/>
+          </p:cNvSpPr>
+          <p:nvPr>
+            <p:ph type="dt" sz="half" idx="10"/>
           </p:nvPr>
         </p:nvSpPr>
         <p:spPr/>
@@ -11344,33 +11690,7 @@
             <a:pPr>
               <a:defRPr/>
             </a:pPr>
-            <a:r>
-              <a:rPr lang="fr-FR" smtClean="0"/>
-              <a:t>Thales - IGN / COGIT - MATIS</a:t>
-            </a:r>
-            <a:endParaRPr lang="fr-FR" dirty="0"/>
-          </a:p>
-        </p:txBody>
-      </p:sp>
-      <p:sp>
-        <p:nvSpPr>
-          <p:cNvPr id="4" name="Espace réservé de la date 3"/>
-          <p:cNvSpPr>
-            <a:spLocks noGrp="1"/>
-          </p:cNvSpPr>
-          <p:nvPr>
-            <p:ph type="dt" sz="half" idx="11"/>
-          </p:nvPr>
-        </p:nvSpPr>
-        <p:spPr/>
-        <p:txBody>
-          <a:bodyPr/>
-          <a:lstStyle/>
-          <a:p>
-            <a:pPr>
-              <a:defRPr/>
-            </a:pPr>
-            <a:fld id="{1305F5B3-A6E5-40AA-A82B-787F42B9B41F}" type="datetime1">
+            <a:fld id="{E213AF71-F760-4AA3-87B2-C2FBB7A81BCA}" type="datetime1">
               <a:rPr lang="fr-FR" smtClean="0"/>
               <a:pPr>
                 <a:defRPr/>
@@ -11383,7 +11703,33 @@
       </p:sp>
       <p:sp>
         <p:nvSpPr>
-          <p:cNvPr id="5" name="Espace réservé du numéro de diapositive 4"/>
+          <p:cNvPr id="5" name="Espace réservé du pied de page 4"/>
+          <p:cNvSpPr>
+            <a:spLocks noGrp="1"/>
+          </p:cNvSpPr>
+          <p:nvPr>
+            <p:ph type="ftr" sz="quarter" idx="11"/>
+          </p:nvPr>
+        </p:nvSpPr>
+        <p:spPr/>
+        <p:txBody>
+          <a:bodyPr/>
+          <a:lstStyle/>
+          <a:p>
+            <a:pPr>
+              <a:defRPr/>
+            </a:pPr>
+            <a:r>
+              <a:rPr lang="fr-FR" smtClean="0"/>
+              <a:t>Thales - IGN / COGIT - MATIS</a:t>
+            </a:r>
+            <a:endParaRPr lang="fr-FR" dirty="0"/>
+          </a:p>
+        </p:txBody>
+      </p:sp>
+      <p:sp>
+        <p:nvSpPr>
+          <p:cNvPr id="6" name="Espace réservé du numéro de diapositive 5"/>
           <p:cNvSpPr>
             <a:spLocks noGrp="1"/>
           </p:cNvSpPr>
@@ -11399,7 +11745,7 @@
             <a:pPr>
               <a:defRPr/>
             </a:pPr>
-            <a:fld id="{F70D7BCD-66D0-4372-890E-9084B1AF6A1A}" type="slidenum">
+            <a:fld id="{504B660C-1446-45BE-A6D7-15805AAE1919}" type="slidenum">
               <a:rPr lang="fr-FR" smtClean="0"/>
               <a:pPr>
                 <a:defRPr/>
@@ -11409,35 +11755,6 @@
             <a:r>
               <a:rPr lang="fr-FR" smtClean="0"/>
               <a:t>/</a:t>
-            </a:r>
-            <a:endParaRPr lang="fr-FR" dirty="0"/>
-          </a:p>
-        </p:txBody>
-      </p:sp>
-      <p:sp>
-        <p:nvSpPr>
-          <p:cNvPr id="6" name="Espace réservé du contenu 5"/>
-          <p:cNvSpPr>
-            <a:spLocks noGrp="1"/>
-          </p:cNvSpPr>
-          <p:nvPr>
-            <p:ph idx="1"/>
-          </p:nvPr>
-        </p:nvSpPr>
-        <p:spPr/>
-        <p:txBody>
-          <a:bodyPr/>
-          <a:lstStyle/>
-          <a:p>
-            <a:r>
-              <a:rPr lang="fr-FR" dirty="0" smtClean="0"/>
-              <a:t>Documentation</a:t>
-            </a:r>
-          </a:p>
-          <a:p>
-            <a:r>
-              <a:rPr lang="fr-FR" dirty="0" err="1" smtClean="0"/>
-              <a:t>tools</a:t>
             </a:r>
             <a:endParaRPr lang="fr-FR" dirty="0"/>
           </a:p>
@@ -11485,7 +11802,7 @@
           <a:p>
             <a:r>
               <a:rPr lang="fr-FR" dirty="0" smtClean="0"/>
-              <a:t>Doc</a:t>
+              <a:t>ressources</a:t>
             </a:r>
             <a:endParaRPr lang="fr-FR" dirty="0"/>
           </a:p>
@@ -11493,12 +11810,12 @@
       </p:sp>
       <p:sp>
         <p:nvSpPr>
-          <p:cNvPr id="3" name="Espace réservé du contenu 2"/>
-          <p:cNvSpPr>
-            <a:spLocks noGrp="1"/>
-          </p:cNvSpPr>
-          <p:nvPr>
-            <p:ph idx="1"/>
+          <p:cNvPr id="3" name="Espace réservé du pied de page 2"/>
+          <p:cNvSpPr>
+            <a:spLocks noGrp="1"/>
+          </p:cNvSpPr>
+          <p:nvPr>
+            <p:ph type="ftr" sz="quarter" idx="10"/>
           </p:nvPr>
         </p:nvSpPr>
         <p:spPr/>
@@ -11506,159 +11823,12 @@
           <a:bodyPr/>
           <a:lstStyle/>
           <a:p>
-            <a:r>
-              <a:rPr lang="fr-FR" dirty="0" smtClean="0"/>
-              <a:t>[1] J. </a:t>
-            </a:r>
-            <a:r>
-              <a:rPr lang="fr-FR" dirty="0" err="1" smtClean="0"/>
-              <a:t>Demantké</a:t>
-            </a:r>
-            <a:r>
-              <a:rPr lang="fr-FR" dirty="0" smtClean="0"/>
-              <a:t>: </a:t>
-            </a:r>
-            <a:r>
-              <a:rPr lang="fr-FR" dirty="0" err="1" smtClean="0"/>
-              <a:t>thesis</a:t>
-            </a:r>
-            <a:endParaRPr lang="fr-FR" dirty="0" smtClean="0"/>
-          </a:p>
-          <a:p>
-            <a:r>
-              <a:rPr lang="fr-FR" dirty="0" smtClean="0"/>
-              <a:t>[2] P. </a:t>
-            </a:r>
-            <a:r>
-              <a:rPr lang="fr-FR" dirty="0" err="1" smtClean="0"/>
-              <a:t>Ramsey</a:t>
-            </a:r>
-            <a:r>
-              <a:rPr lang="fr-FR" dirty="0" smtClean="0"/>
-              <a:t> </a:t>
-            </a:r>
-            <a:r>
-              <a:rPr lang="fr-FR" dirty="0" err="1" smtClean="0"/>
-              <a:t>presentation</a:t>
-            </a:r>
-            <a:r>
-              <a:rPr lang="fr-FR" dirty="0" smtClean="0"/>
-              <a:t> of </a:t>
-            </a:r>
-            <a:r>
-              <a:rPr lang="fr-FR" dirty="0" err="1" smtClean="0"/>
-              <a:t>PointCloud</a:t>
-            </a:r>
-            <a:r>
-              <a:rPr lang="fr-FR" dirty="0" smtClean="0"/>
-              <a:t> : boundlessgeo.com/</a:t>
-            </a:r>
-            <a:r>
-              <a:rPr lang="fr-FR" dirty="0" err="1" smtClean="0"/>
-              <a:t>wp</a:t>
-            </a:r>
-            <a:r>
-              <a:rPr lang="fr-FR" dirty="0" smtClean="0"/>
-              <a:t>-content/</a:t>
-            </a:r>
-            <a:r>
-              <a:rPr lang="fr-FR" dirty="0" err="1" smtClean="0"/>
-              <a:t>uploads</a:t>
-            </a:r>
-            <a:r>
-              <a:rPr lang="fr-FR" dirty="0" smtClean="0"/>
-              <a:t>/2013/10/pgpointcloud-foss4-2013.pdf</a:t>
-            </a:r>
-          </a:p>
-          <a:p>
-            <a:endParaRPr lang="fr-FR" dirty="0" smtClean="0"/>
-          </a:p>
-          <a:p>
-            <a:r>
-              <a:rPr lang="fr-FR" dirty="0" smtClean="0"/>
-              <a:t>[3] : Point </a:t>
-            </a:r>
-            <a:r>
-              <a:rPr lang="fr-FR" dirty="0" err="1" smtClean="0"/>
-              <a:t>cloud</a:t>
-            </a:r>
-            <a:r>
-              <a:rPr lang="fr-FR" dirty="0" smtClean="0"/>
-              <a:t> data management</a:t>
-            </a:r>
-            <a:br>
-              <a:rPr lang="fr-FR" dirty="0" smtClean="0"/>
-            </a:br>
-            <a:r>
-              <a:rPr lang="fr-FR" i="1" dirty="0" smtClean="0"/>
-              <a:t>Peter van </a:t>
-            </a:r>
-            <a:r>
-              <a:rPr lang="fr-FR" i="1" dirty="0" err="1" smtClean="0"/>
-              <a:t>Oosterom</a:t>
-            </a:r>
-            <a:r>
-              <a:rPr lang="fr-FR" i="1" dirty="0" smtClean="0"/>
-              <a:t>, Siva </a:t>
-            </a:r>
-            <a:r>
-              <a:rPr lang="fr-FR" i="1" dirty="0" err="1" smtClean="0"/>
-              <a:t>Ravada</a:t>
-            </a:r>
-            <a:r>
-              <a:rPr lang="fr-FR" i="1" dirty="0" smtClean="0"/>
-              <a:t>, Mike </a:t>
-            </a:r>
-            <a:r>
-              <a:rPr lang="fr-FR" i="1" dirty="0" err="1" smtClean="0"/>
-              <a:t>Horhammer</a:t>
-            </a:r>
-            <a:r>
-              <a:rPr lang="fr-FR" i="1" dirty="0" smtClean="0"/>
-              <a:t>, Oscar Marinez </a:t>
-            </a:r>
-            <a:r>
-              <a:rPr lang="fr-FR" i="1" dirty="0" err="1" smtClean="0"/>
-              <a:t>Rubi</a:t>
-            </a:r>
-            <a:r>
-              <a:rPr lang="fr-FR" i="1" dirty="0" smtClean="0"/>
-              <a:t>, Milena </a:t>
-            </a:r>
-            <a:r>
-              <a:rPr lang="fr-FR" i="1" dirty="0" err="1" smtClean="0"/>
-              <a:t>Ivanova</a:t>
-            </a:r>
-            <a:r>
-              <a:rPr lang="fr-FR" i="1" dirty="0" smtClean="0"/>
-              <a:t>, Martin </a:t>
-            </a:r>
-            <a:r>
-              <a:rPr lang="fr-FR" i="1" dirty="0" err="1" smtClean="0"/>
-              <a:t>Kodde</a:t>
-            </a:r>
-            <a:r>
-              <a:rPr lang="fr-FR" i="1" dirty="0" smtClean="0"/>
-              <a:t> and Theo </a:t>
-            </a:r>
-            <a:r>
-              <a:rPr lang="fr-FR" i="1" dirty="0" err="1" smtClean="0"/>
-              <a:t>Tijssen</a:t>
-            </a:r>
-            <a:r>
-              <a:rPr lang="fr-FR" i="1" dirty="0" smtClean="0"/>
-              <a:t/>
-            </a:r>
-            <a:br>
-              <a:rPr lang="fr-FR" i="1" dirty="0" smtClean="0"/>
-            </a:br>
-            <a:r>
-              <a:rPr lang="en-US" i="1" dirty="0" err="1" smtClean="0"/>
-              <a:t>IQmulus</a:t>
-            </a:r>
-            <a:r>
-              <a:rPr lang="en-US" i="1" dirty="0" smtClean="0"/>
-              <a:t> Workshop on Processing Large Geospatial Data, 8 July 2014, Cardiff, Wales, UK</a:t>
+            <a:pPr>
+              <a:defRPr/>
+            </a:pPr>
+            <a:r>
+              <a:rPr lang="fr-FR" smtClean="0"/>
+              <a:t>Thales - IGN / COGIT - MATIS</a:t>
             </a:r>
             <a:endParaRPr lang="fr-FR" dirty="0"/>
           </a:p>
@@ -11671,7 +11841,7 @@
             <a:spLocks noGrp="1"/>
           </p:cNvSpPr>
           <p:nvPr>
-            <p:ph type="dt" sz="half" idx="10"/>
+            <p:ph type="dt" sz="half" idx="11"/>
           </p:nvPr>
         </p:nvSpPr>
         <p:spPr/>
@@ -11682,7 +11852,7 @@
             <a:pPr>
               <a:defRPr/>
             </a:pPr>
-            <a:fld id="{E213AF71-F760-4AA3-87B2-C2FBB7A81BCA}" type="datetime1">
+            <a:fld id="{1305F5B3-A6E5-40AA-A82B-787F42B9B41F}" type="datetime1">
               <a:rPr lang="fr-FR" smtClean="0"/>
               <a:pPr>
                 <a:defRPr/>
@@ -11695,12 +11865,12 @@
       </p:sp>
       <p:sp>
         <p:nvSpPr>
-          <p:cNvPr id="5" name="Espace réservé du pied de page 4"/>
-          <p:cNvSpPr>
-            <a:spLocks noGrp="1"/>
-          </p:cNvSpPr>
-          <p:nvPr>
-            <p:ph type="ftr" sz="quarter" idx="11"/>
+          <p:cNvPr id="5" name="Espace réservé du numéro de diapositive 4"/>
+          <p:cNvSpPr>
+            <a:spLocks noGrp="1"/>
+          </p:cNvSpPr>
+          <p:nvPr>
+            <p:ph type="sldNum" sz="quarter" idx="12"/>
           </p:nvPr>
         </p:nvSpPr>
         <p:spPr/>
@@ -11711,33 +11881,7 @@
             <a:pPr>
               <a:defRPr/>
             </a:pPr>
-            <a:r>
-              <a:rPr lang="fr-FR" smtClean="0"/>
-              <a:t>Thales - IGN / COGIT - MATIS</a:t>
-            </a:r>
-            <a:endParaRPr lang="fr-FR" dirty="0"/>
-          </a:p>
-        </p:txBody>
-      </p:sp>
-      <p:sp>
-        <p:nvSpPr>
-          <p:cNvPr id="6" name="Espace réservé du numéro de diapositive 5"/>
-          <p:cNvSpPr>
-            <a:spLocks noGrp="1"/>
-          </p:cNvSpPr>
-          <p:nvPr>
-            <p:ph type="sldNum" sz="quarter" idx="12"/>
-          </p:nvPr>
-        </p:nvSpPr>
-        <p:spPr/>
-        <p:txBody>
-          <a:bodyPr/>
-          <a:lstStyle/>
-          <a:p>
-            <a:pPr>
-              <a:defRPr/>
-            </a:pPr>
-            <a:fld id="{504B660C-1446-45BE-A6D7-15805AAE1919}" type="slidenum">
+            <a:fld id="{F70D7BCD-66D0-4372-890E-9084B1AF6A1A}" type="slidenum">
               <a:rPr lang="fr-FR" smtClean="0"/>
               <a:pPr>
                 <a:defRPr/>
@@ -11747,6 +11891,35 @@
             <a:r>
               <a:rPr lang="fr-FR" smtClean="0"/>
               <a:t>/</a:t>
+            </a:r>
+            <a:endParaRPr lang="fr-FR" dirty="0"/>
+          </a:p>
+        </p:txBody>
+      </p:sp>
+      <p:sp>
+        <p:nvSpPr>
+          <p:cNvPr id="6" name="Espace réservé du contenu 5"/>
+          <p:cNvSpPr>
+            <a:spLocks noGrp="1"/>
+          </p:cNvSpPr>
+          <p:nvPr>
+            <p:ph idx="1"/>
+          </p:nvPr>
+        </p:nvSpPr>
+        <p:spPr/>
+        <p:txBody>
+          <a:bodyPr/>
+          <a:lstStyle/>
+          <a:p>
+            <a:r>
+              <a:rPr lang="fr-FR" dirty="0" smtClean="0"/>
+              <a:t>Documentation</a:t>
+            </a:r>
+          </a:p>
+          <a:p>
+            <a:r>
+              <a:rPr lang="fr-FR" dirty="0" err="1" smtClean="0"/>
+              <a:t>tools</a:t>
             </a:r>
             <a:endParaRPr lang="fr-FR" dirty="0"/>
           </a:p>
@@ -11794,7 +11967,7 @@
           <a:p>
             <a:r>
               <a:rPr lang="fr-FR" dirty="0" smtClean="0"/>
-              <a:t>TOOLS</a:t>
+              <a:t>Doc</a:t>
             </a:r>
             <a:endParaRPr lang="fr-FR" dirty="0"/>
           </a:p>
@@ -11817,20 +11990,66 @@
           <a:p>
             <a:r>
               <a:rPr lang="fr-FR" dirty="0" smtClean="0"/>
-              <a:t>POINTCLOUD</a:t>
-            </a:r>
-          </a:p>
-          <a:p>
+              <a:t>[1] J. </a:t>
+            </a:r>
             <a:r>
               <a:rPr lang="fr-FR" dirty="0" err="1" smtClean="0"/>
-              <a:t>CLoudCompare</a:t>
+              <a:t>Demantké</a:t>
+            </a:r>
+            <a:r>
+              <a:rPr lang="fr-FR" dirty="0" smtClean="0"/>
+              <a:t>: </a:t>
+            </a:r>
+            <a:r>
+              <a:rPr lang="fr-FR" dirty="0" err="1" smtClean="0"/>
+              <a:t>thesis</a:t>
             </a:r>
             <a:endParaRPr lang="fr-FR" dirty="0" smtClean="0"/>
           </a:p>
           <a:p>
             <a:r>
               <a:rPr lang="fr-FR" dirty="0" smtClean="0"/>
-              <a:t>RPLY</a:t>
+              <a:t>[2] P. </a:t>
+            </a:r>
+            <a:r>
+              <a:rPr lang="fr-FR" dirty="0" err="1" smtClean="0"/>
+              <a:t>Ramsey</a:t>
+            </a:r>
+            <a:r>
+              <a:rPr lang="fr-FR" dirty="0" smtClean="0"/>
+              <a:t> </a:t>
+            </a:r>
+            <a:r>
+              <a:rPr lang="fr-FR" dirty="0" err="1" smtClean="0"/>
+              <a:t>presentation</a:t>
+            </a:r>
+            <a:r>
+              <a:rPr lang="fr-FR" dirty="0" smtClean="0"/>
+              <a:t> of </a:t>
+            </a:r>
+            <a:r>
+              <a:rPr lang="fr-FR" dirty="0" err="1" smtClean="0"/>
+              <a:t>PointCloud</a:t>
+            </a:r>
+            <a:r>
+              <a:rPr lang="fr-FR" dirty="0" smtClean="0"/>
+              <a:t> : boundlessgeo.com/</a:t>
+            </a:r>
+            <a:r>
+              <a:rPr lang="fr-FR" dirty="0" err="1" smtClean="0"/>
+              <a:t>wp</a:t>
+            </a:r>
+            <a:r>
+              <a:rPr lang="fr-FR" dirty="0" smtClean="0"/>
+              <a:t>-content/</a:t>
+            </a:r>
+            <a:r>
+              <a:rPr lang="fr-FR" dirty="0" err="1" smtClean="0"/>
+              <a:t>uploads</a:t>
+            </a:r>
+            <a:r>
+              <a:rPr lang="fr-FR" dirty="0" smtClean="0"/>
+              <a:t>/2013/10/pgpointcloud-foss4-2013.pdf</a:t>
             </a:r>
           </a:p>
           <a:p>
@@ -11839,10 +12058,90 @@
           <a:p>
             <a:r>
               <a:rPr lang="fr-FR" dirty="0" smtClean="0"/>
-              <a:t>QGIS</a:t>
-            </a:r>
-          </a:p>
-          <a:p>
+              <a:t>[3] : Point </a:t>
+            </a:r>
+            <a:r>
+              <a:rPr lang="fr-FR" dirty="0" err="1" smtClean="0"/>
+              <a:t>cloud</a:t>
+            </a:r>
+            <a:r>
+              <a:rPr lang="fr-FR" dirty="0" smtClean="0"/>
+              <a:t> data management</a:t>
+            </a:r>
+            <a:br>
+              <a:rPr lang="fr-FR" dirty="0" smtClean="0"/>
+            </a:br>
+            <a:r>
+              <a:rPr lang="fr-FR" i="1" dirty="0" smtClean="0"/>
+              <a:t>Peter van </a:t>
+            </a:r>
+            <a:r>
+              <a:rPr lang="fr-FR" i="1" dirty="0" err="1" smtClean="0"/>
+              <a:t>Oosterom</a:t>
+            </a:r>
+            <a:r>
+              <a:rPr lang="fr-FR" i="1" dirty="0" smtClean="0"/>
+              <a:t>, Siva </a:t>
+            </a:r>
+            <a:r>
+              <a:rPr lang="fr-FR" i="1" dirty="0" err="1" smtClean="0"/>
+              <a:t>Ravada</a:t>
+            </a:r>
+            <a:r>
+              <a:rPr lang="fr-FR" i="1" dirty="0" smtClean="0"/>
+              <a:t>, Mike </a:t>
+            </a:r>
+            <a:r>
+              <a:rPr lang="fr-FR" i="1" dirty="0" err="1" smtClean="0"/>
+              <a:t>Horhammer</a:t>
+            </a:r>
+            <a:r>
+              <a:rPr lang="fr-FR" i="1" dirty="0" smtClean="0"/>
+              <a:t>, Oscar Marinez </a:t>
+            </a:r>
+            <a:r>
+              <a:rPr lang="fr-FR" i="1" dirty="0" err="1" smtClean="0"/>
+              <a:t>Rubi</a:t>
+            </a:r>
+            <a:r>
+              <a:rPr lang="fr-FR" i="1" dirty="0" smtClean="0"/>
+              <a:t>, Milena </a:t>
+            </a:r>
+            <a:r>
+              <a:rPr lang="fr-FR" i="1" dirty="0" err="1" smtClean="0"/>
+              <a:t>Ivanova</a:t>
+            </a:r>
+            <a:r>
+              <a:rPr lang="fr-FR" i="1" dirty="0" smtClean="0"/>
+              <a:t>, Martin </a:t>
+            </a:r>
+            <a:r>
+              <a:rPr lang="fr-FR" i="1" dirty="0" err="1" smtClean="0"/>
+              <a:t>Kodde</a:t>
+            </a:r>
+            <a:r>
+              <a:rPr lang="fr-FR" i="1" dirty="0" smtClean="0"/>
+              <a:t> and Theo </a:t>
+            </a:r>
+            <a:r>
+              <a:rPr lang="fr-FR" i="1" dirty="0" err="1" smtClean="0"/>
+              <a:t>Tijssen</a:t>
+            </a:r>
+            <a:r>
+              <a:rPr lang="fr-FR" i="1" dirty="0" smtClean="0"/>
+              <a:t/>
+            </a:r>
+            <a:br>
+              <a:rPr lang="fr-FR" i="1" dirty="0" smtClean="0"/>
+            </a:br>
+            <a:r>
+              <a:rPr lang="en-US" i="1" dirty="0" err="1" smtClean="0"/>
+              <a:t>IQmulus</a:t>
+            </a:r>
+            <a:r>
+              <a:rPr lang="en-US" i="1" dirty="0" smtClean="0"/>
+              <a:t> Workshop on Processing Large Geospatial Data, 8 July 2014, Cardiff, Wales, UK</a:t>
+            </a:r>
             <a:endParaRPr lang="fr-FR" dirty="0"/>
           </a:p>
         </p:txBody>
@@ -11977,7 +12276,7 @@
           <a:p>
             <a:r>
               <a:rPr lang="fr-FR" dirty="0" smtClean="0"/>
-              <a:t>Annexes</a:t>
+              <a:t>TOOLS</a:t>
             </a:r>
             <a:endParaRPr lang="fr-FR" dirty="0"/>
           </a:p>
@@ -11985,12 +12284,12 @@
       </p:sp>
       <p:sp>
         <p:nvSpPr>
-          <p:cNvPr id="3" name="Espace réservé du pied de page 2"/>
-          <p:cNvSpPr>
-            <a:spLocks noGrp="1"/>
-          </p:cNvSpPr>
-          <p:nvPr>
-            <p:ph type="ftr" sz="quarter" idx="10"/>
+          <p:cNvPr id="3" name="Espace réservé du contenu 2"/>
+          <p:cNvSpPr>
+            <a:spLocks noGrp="1"/>
+          </p:cNvSpPr>
+          <p:nvPr>
+            <p:ph idx="1"/>
           </p:nvPr>
         </p:nvSpPr>
         <p:spPr/>
@@ -11998,36 +12297,57 @@
           <a:bodyPr/>
           <a:lstStyle/>
           <a:p>
+            <a:r>
+              <a:rPr lang="fr-FR" dirty="0" smtClean="0"/>
+              <a:t>POINTCLOUD</a:t>
+            </a:r>
+          </a:p>
+          <a:p>
+            <a:r>
+              <a:rPr lang="fr-FR" dirty="0" err="1" smtClean="0"/>
+              <a:t>CLoudCompare</a:t>
+            </a:r>
+            <a:endParaRPr lang="fr-FR" dirty="0" smtClean="0"/>
+          </a:p>
+          <a:p>
+            <a:r>
+              <a:rPr lang="fr-FR" dirty="0" smtClean="0"/>
+              <a:t>RPLY</a:t>
+            </a:r>
+          </a:p>
+          <a:p>
+            <a:endParaRPr lang="fr-FR" dirty="0" smtClean="0"/>
+          </a:p>
+          <a:p>
+            <a:r>
+              <a:rPr lang="fr-FR" dirty="0" smtClean="0"/>
+              <a:t>QGIS</a:t>
+            </a:r>
+          </a:p>
+          <a:p>
+            <a:endParaRPr lang="fr-FR" dirty="0"/>
+          </a:p>
+        </p:txBody>
+      </p:sp>
+      <p:sp>
+        <p:nvSpPr>
+          <p:cNvPr id="4" name="Espace réservé de la date 3"/>
+          <p:cNvSpPr>
+            <a:spLocks noGrp="1"/>
+          </p:cNvSpPr>
+          <p:nvPr>
+            <p:ph type="dt" sz="half" idx="10"/>
+          </p:nvPr>
+        </p:nvSpPr>
+        <p:spPr/>
+        <p:txBody>
+          <a:bodyPr/>
+          <a:lstStyle/>
+          <a:p>
             <a:pPr>
               <a:defRPr/>
             </a:pPr>
-            <a:r>
-              <a:rPr lang="fr-FR" smtClean="0"/>
-              <a:t>Thales - IGN / COGIT - MATIS</a:t>
-            </a:r>
-            <a:endParaRPr lang="fr-FR" dirty="0"/>
-          </a:p>
-        </p:txBody>
-      </p:sp>
-      <p:sp>
-        <p:nvSpPr>
-          <p:cNvPr id="4" name="Espace réservé de la date 3"/>
-          <p:cNvSpPr>
-            <a:spLocks noGrp="1"/>
-          </p:cNvSpPr>
-          <p:nvPr>
-            <p:ph type="dt" sz="half" idx="11"/>
-          </p:nvPr>
-        </p:nvSpPr>
-        <p:spPr/>
-        <p:txBody>
-          <a:bodyPr/>
-          <a:lstStyle/>
-          <a:p>
-            <a:pPr>
-              <a:defRPr/>
-            </a:pPr>
-            <a:fld id="{1305F5B3-A6E5-40AA-A82B-787F42B9B41F}" type="datetime1">
+            <a:fld id="{E213AF71-F760-4AA3-87B2-C2FBB7A81BCA}" type="datetime1">
               <a:rPr lang="fr-FR" smtClean="0"/>
               <a:pPr>
                 <a:defRPr/>
@@ -12040,7 +12360,33 @@
       </p:sp>
       <p:sp>
         <p:nvSpPr>
-          <p:cNvPr id="5" name="Espace réservé du numéro de diapositive 4"/>
+          <p:cNvPr id="5" name="Espace réservé du pied de page 4"/>
+          <p:cNvSpPr>
+            <a:spLocks noGrp="1"/>
+          </p:cNvSpPr>
+          <p:nvPr>
+            <p:ph type="ftr" sz="quarter" idx="11"/>
+          </p:nvPr>
+        </p:nvSpPr>
+        <p:spPr/>
+        <p:txBody>
+          <a:bodyPr/>
+          <a:lstStyle/>
+          <a:p>
+            <a:pPr>
+              <a:defRPr/>
+            </a:pPr>
+            <a:r>
+              <a:rPr lang="fr-FR" smtClean="0"/>
+              <a:t>Thales - IGN / COGIT - MATIS</a:t>
+            </a:r>
+            <a:endParaRPr lang="fr-FR" dirty="0"/>
+          </a:p>
+        </p:txBody>
+      </p:sp>
+      <p:sp>
+        <p:nvSpPr>
+          <p:cNvPr id="6" name="Espace réservé du numéro de diapositive 5"/>
           <p:cNvSpPr>
             <a:spLocks noGrp="1"/>
           </p:cNvSpPr>
@@ -12056,7 +12402,7 @@
             <a:pPr>
               <a:defRPr/>
             </a:pPr>
-            <a:fld id="{F70D7BCD-66D0-4372-890E-9084B1AF6A1A}" type="slidenum">
+            <a:fld id="{504B660C-1446-45BE-A6D7-15805AAE1919}" type="slidenum">
               <a:rPr lang="fr-FR" smtClean="0"/>
               <a:pPr>
                 <a:defRPr/>
@@ -12066,37 +12412,6 @@
             <a:r>
               <a:rPr lang="fr-FR" smtClean="0"/>
               <a:t>/</a:t>
-            </a:r>
-            <a:endParaRPr lang="fr-FR" dirty="0"/>
-          </a:p>
-        </p:txBody>
-      </p:sp>
-      <p:sp>
-        <p:nvSpPr>
-          <p:cNvPr id="6" name="Espace réservé du contenu 5"/>
-          <p:cNvSpPr>
-            <a:spLocks noGrp="1"/>
-          </p:cNvSpPr>
-          <p:nvPr>
-            <p:ph idx="1"/>
-          </p:nvPr>
-        </p:nvSpPr>
-        <p:spPr/>
-        <p:txBody>
-          <a:bodyPr/>
-          <a:lstStyle/>
-          <a:p>
-            <a:r>
-              <a:rPr lang="fr-FR" dirty="0" err="1" smtClean="0"/>
-              <a:t>Sensor</a:t>
-            </a:r>
-            <a:r>
-              <a:rPr lang="fr-FR" dirty="0" smtClean="0"/>
-              <a:t> </a:t>
-            </a:r>
-            <a:r>
-              <a:rPr lang="fr-FR" dirty="0" err="1" smtClean="0"/>
-              <a:t>view</a:t>
             </a:r>
             <a:endParaRPr lang="fr-FR" dirty="0"/>
           </a:p>
@@ -12144,6 +12459,173 @@
           <a:p>
             <a:r>
               <a:rPr lang="fr-FR" dirty="0" smtClean="0"/>
+              <a:t>Annexes</a:t>
+            </a:r>
+            <a:endParaRPr lang="fr-FR" dirty="0"/>
+          </a:p>
+        </p:txBody>
+      </p:sp>
+      <p:sp>
+        <p:nvSpPr>
+          <p:cNvPr id="3" name="Espace réservé du pied de page 2"/>
+          <p:cNvSpPr>
+            <a:spLocks noGrp="1"/>
+          </p:cNvSpPr>
+          <p:nvPr>
+            <p:ph type="ftr" sz="quarter" idx="10"/>
+          </p:nvPr>
+        </p:nvSpPr>
+        <p:spPr/>
+        <p:txBody>
+          <a:bodyPr/>
+          <a:lstStyle/>
+          <a:p>
+            <a:pPr>
+              <a:defRPr/>
+            </a:pPr>
+            <a:r>
+              <a:rPr lang="fr-FR" smtClean="0"/>
+              <a:t>Thales - IGN / COGIT - MATIS</a:t>
+            </a:r>
+            <a:endParaRPr lang="fr-FR" dirty="0"/>
+          </a:p>
+        </p:txBody>
+      </p:sp>
+      <p:sp>
+        <p:nvSpPr>
+          <p:cNvPr id="4" name="Espace réservé de la date 3"/>
+          <p:cNvSpPr>
+            <a:spLocks noGrp="1"/>
+          </p:cNvSpPr>
+          <p:nvPr>
+            <p:ph type="dt" sz="half" idx="11"/>
+          </p:nvPr>
+        </p:nvSpPr>
+        <p:spPr/>
+        <p:txBody>
+          <a:bodyPr/>
+          <a:lstStyle/>
+          <a:p>
+            <a:pPr>
+              <a:defRPr/>
+            </a:pPr>
+            <a:fld id="{1305F5B3-A6E5-40AA-A82B-787F42B9B41F}" type="datetime1">
+              <a:rPr lang="fr-FR" smtClean="0"/>
+              <a:pPr>
+                <a:defRPr/>
+              </a:pPr>
+              <a:t>23/09/2014</a:t>
+            </a:fld>
+            <a:endParaRPr lang="fr-FR" dirty="0"/>
+          </a:p>
+        </p:txBody>
+      </p:sp>
+      <p:sp>
+        <p:nvSpPr>
+          <p:cNvPr id="5" name="Espace réservé du numéro de diapositive 4"/>
+          <p:cNvSpPr>
+            <a:spLocks noGrp="1"/>
+          </p:cNvSpPr>
+          <p:nvPr>
+            <p:ph type="sldNum" sz="quarter" idx="12"/>
+          </p:nvPr>
+        </p:nvSpPr>
+        <p:spPr/>
+        <p:txBody>
+          <a:bodyPr/>
+          <a:lstStyle/>
+          <a:p>
+            <a:pPr>
+              <a:defRPr/>
+            </a:pPr>
+            <a:fld id="{F70D7BCD-66D0-4372-890E-9084B1AF6A1A}" type="slidenum">
+              <a:rPr lang="fr-FR" smtClean="0"/>
+              <a:pPr>
+                <a:defRPr/>
+              </a:pPr>
+              <a:t>25</a:t>
+            </a:fld>
+            <a:r>
+              <a:rPr lang="fr-FR" smtClean="0"/>
+              <a:t>/</a:t>
+            </a:r>
+            <a:endParaRPr lang="fr-FR" dirty="0"/>
+          </a:p>
+        </p:txBody>
+      </p:sp>
+      <p:sp>
+        <p:nvSpPr>
+          <p:cNvPr id="6" name="Espace réservé du contenu 5"/>
+          <p:cNvSpPr>
+            <a:spLocks noGrp="1"/>
+          </p:cNvSpPr>
+          <p:nvPr>
+            <p:ph idx="1"/>
+          </p:nvPr>
+        </p:nvSpPr>
+        <p:spPr/>
+        <p:txBody>
+          <a:bodyPr/>
+          <a:lstStyle/>
+          <a:p>
+            <a:r>
+              <a:rPr lang="fr-FR" dirty="0" err="1" smtClean="0"/>
+              <a:t>Sensor</a:t>
+            </a:r>
+            <a:r>
+              <a:rPr lang="fr-FR" dirty="0" smtClean="0"/>
+              <a:t> </a:t>
+            </a:r>
+            <a:r>
+              <a:rPr lang="fr-FR" dirty="0" err="1" smtClean="0"/>
+              <a:t>view</a:t>
+            </a:r>
+            <a:endParaRPr lang="fr-FR" dirty="0"/>
+          </a:p>
+        </p:txBody>
+      </p:sp>
+    </p:spTree>
+  </p:cSld>
+  <p:clrMapOvr>
+    <a:masterClrMapping/>
+  </p:clrMapOvr>
+</p:sld>
+</file>
+
+<file path=ppt/slides/slide26.xml><?xml version="1.0" encoding="utf-8"?>
+<p:sld xmlns:a="http://schemas.openxmlformats.org/drawingml/2006/main" xmlns:r="http://schemas.openxmlformats.org/officeDocument/2006/relationships" xmlns:p="http://schemas.openxmlformats.org/presentationml/2006/main">
+  <p:cSld>
+    <p:spTree>
+      <p:nvGrpSpPr>
+        <p:cNvPr id="1" name=""/>
+        <p:cNvGrpSpPr/>
+        <p:nvPr/>
+      </p:nvGrpSpPr>
+      <p:grpSpPr>
+        <a:xfrm>
+          <a:off x="0" y="0"/>
+          <a:ext cx="0" cy="0"/>
+          <a:chOff x="0" y="0"/>
+          <a:chExt cx="0" cy="0"/>
+        </a:xfrm>
+      </p:grpSpPr>
+      <p:sp>
+        <p:nvSpPr>
+          <p:cNvPr id="2" name="Titre 1"/>
+          <p:cNvSpPr>
+            <a:spLocks noGrp="1"/>
+          </p:cNvSpPr>
+          <p:nvPr>
+            <p:ph type="title"/>
+          </p:nvPr>
+        </p:nvSpPr>
+        <p:spPr/>
+        <p:txBody>
+          <a:bodyPr/>
+          <a:lstStyle/>
+          <a:p>
+            <a:r>
+              <a:rPr lang="fr-FR" dirty="0" smtClean="0"/>
               <a:t>ANNEXES</a:t>
             </a:r>
             <a:endParaRPr lang="fr-FR" dirty="0"/>
@@ -12259,7 +12741,7 @@
               <a:pPr>
                 <a:defRPr/>
               </a:pPr>
-              <a:t>25</a:t>
+              <a:t>26</a:t>
             </a:fld>
             <a:r>
               <a:rPr lang="fr-FR" smtClean="0"/>
@@ -12333,69 +12815,6 @@
 </p:sld>
 </file>
 
-<file path=ppt/slides/slide26.xml><?xml version="1.0" encoding="utf-8"?>
-<p:sld xmlns:a="http://schemas.openxmlformats.org/drawingml/2006/main" xmlns:r="http://schemas.openxmlformats.org/officeDocument/2006/relationships" xmlns:p="http://schemas.openxmlformats.org/presentationml/2006/main">
-  <p:cSld>
-    <p:spTree>
-      <p:nvGrpSpPr>
-        <p:cNvPr id="1" name=""/>
-        <p:cNvGrpSpPr/>
-        <p:nvPr/>
-      </p:nvGrpSpPr>
-      <p:grpSpPr>
-        <a:xfrm>
-          <a:off x="0" y="0"/>
-          <a:ext cx="0" cy="0"/>
-          <a:chOff x="0" y="0"/>
-          <a:chExt cx="0" cy="0"/>
-        </a:xfrm>
-      </p:grpSpPr>
-      <p:sp>
-        <p:nvSpPr>
-          <p:cNvPr id="2" name="Titre 1"/>
-          <p:cNvSpPr>
-            <a:spLocks noGrp="1"/>
-          </p:cNvSpPr>
-          <p:nvPr>
-            <p:ph type="ctrTitle"/>
-          </p:nvPr>
-        </p:nvSpPr>
-        <p:spPr/>
-        <p:txBody>
-          <a:bodyPr/>
-          <a:lstStyle/>
-          <a:p>
-            <a:endParaRPr lang="en-US"/>
-          </a:p>
-        </p:txBody>
-      </p:sp>
-      <p:sp>
-        <p:nvSpPr>
-          <p:cNvPr id="3" name="Sous-titre 2"/>
-          <p:cNvSpPr>
-            <a:spLocks noGrp="1"/>
-          </p:cNvSpPr>
-          <p:nvPr>
-            <p:ph type="subTitle" idx="1"/>
-          </p:nvPr>
-        </p:nvSpPr>
-        <p:spPr/>
-        <p:txBody>
-          <a:bodyPr/>
-          <a:lstStyle/>
-          <a:p>
-            <a:endParaRPr lang="en-US"/>
-          </a:p>
-        </p:txBody>
-      </p:sp>
-    </p:spTree>
-  </p:cSld>
-  <p:clrMapOvr>
-    <a:masterClrMapping/>
-  </p:clrMapOvr>
-</p:sld>
-</file>
-
 <file path=ppt/slides/slide27.xml><?xml version="1.0" encoding="utf-8"?>
 <p:sld xmlns:a="http://schemas.openxmlformats.org/drawingml/2006/main" xmlns:r="http://schemas.openxmlformats.org/officeDocument/2006/relationships" xmlns:p="http://schemas.openxmlformats.org/presentationml/2006/main">
   <p:cSld>
@@ -12478,12 +12897,12 @@
       </p:grpSpPr>
       <p:sp>
         <p:nvSpPr>
-          <p:cNvPr id="3074" name="Titre 1"/>
-          <p:cNvSpPr>
-            <a:spLocks noGrp="1"/>
-          </p:cNvSpPr>
-          <p:nvPr>
-            <p:ph type="title"/>
+          <p:cNvPr id="2" name="Titre 1"/>
+          <p:cNvSpPr>
+            <a:spLocks noGrp="1"/>
+          </p:cNvSpPr>
+          <p:nvPr>
+            <p:ph type="ctrTitle"/>
           </p:nvPr>
         </p:nvSpPr>
         <p:spPr/>
@@ -12491,337 +12910,26 @@
           <a:bodyPr/>
           <a:lstStyle/>
           <a:p>
-            <a:pPr eaLnBrk="1" hangingPunct="1"/>
-            <a:r>
-              <a:rPr lang="fr-FR" smtClean="0"/>
-              <a:t>Demo postgres	</a:t>
-            </a:r>
-          </a:p>
-        </p:txBody>
-      </p:sp>
-      <p:sp>
-        <p:nvSpPr>
-          <p:cNvPr id="3" name="Espace réservé du contenu 2"/>
-          <p:cNvSpPr>
-            <a:spLocks noGrp="1"/>
-          </p:cNvSpPr>
-          <p:nvPr>
-            <p:ph idx="1"/>
+            <a:endParaRPr lang="en-US"/>
+          </a:p>
+        </p:txBody>
+      </p:sp>
+      <p:sp>
+        <p:nvSpPr>
+          <p:cNvPr id="3" name="Sous-titre 2"/>
+          <p:cNvSpPr>
+            <a:spLocks noGrp="1"/>
+          </p:cNvSpPr>
+          <p:nvPr>
+            <p:ph type="subTitle" idx="1"/>
           </p:nvPr>
         </p:nvSpPr>
         <p:spPr/>
         <p:txBody>
-          <a:bodyPr rtlCol="0">
-            <a:normAutofit fontScale="62500" lnSpcReduction="20000"/>
-          </a:bodyPr>
-          <a:lstStyle/>
-          <a:p>
-            <a:pPr eaLnBrk="1" fontAlgn="auto" hangingPunct="1">
-              <a:spcAft>
-                <a:spcPts val="0"/>
-              </a:spcAft>
-              <a:buFont typeface="Arial" pitchFamily="34" charset="0"/>
-              <a:buChar char="•"/>
-              <a:defRPr/>
-            </a:pPr>
-            <a:r>
-              <a:rPr lang="fr-FR" dirty="0" err="1" smtClean="0"/>
-              <a:t>_introduction</a:t>
-            </a:r>
-            <a:r>
-              <a:rPr lang="fr-FR" dirty="0" smtClean="0"/>
-              <a:t> aux nuages de points &amp; les problématiques de ce genre de données</a:t>
-            </a:r>
-          </a:p>
-          <a:p>
-            <a:pPr eaLnBrk="1" fontAlgn="auto" hangingPunct="1">
-              <a:spcAft>
-                <a:spcPts val="0"/>
-              </a:spcAft>
-              <a:buFont typeface="Arial" pitchFamily="34" charset="0"/>
-              <a:buChar char="•"/>
-              <a:defRPr/>
-            </a:pPr>
-            <a:r>
-              <a:rPr lang="fr-FR" dirty="0" err="1" smtClean="0"/>
-              <a:t>_serveur</a:t>
-            </a:r>
-            <a:r>
-              <a:rPr lang="fr-FR" dirty="0" smtClean="0"/>
-              <a:t> de nuages de points :</a:t>
-            </a:r>
-          </a:p>
-          <a:p>
-            <a:pPr lvl="1" eaLnBrk="1" fontAlgn="auto" hangingPunct="1">
-              <a:spcAft>
-                <a:spcPts val="0"/>
-              </a:spcAft>
-              <a:buFont typeface="Arial" pitchFamily="34" charset="0"/>
-              <a:buChar char="–"/>
-              <a:defRPr/>
-            </a:pPr>
-            <a:r>
-              <a:rPr lang="fr-FR" dirty="0" err="1" smtClean="0"/>
-              <a:t>_stockage</a:t>
-            </a:r>
-            <a:r>
-              <a:rPr lang="fr-FR" dirty="0" smtClean="0"/>
-              <a:t> en base de données avec </a:t>
-            </a:r>
-            <a:r>
-              <a:rPr lang="fr-FR" dirty="0" err="1" smtClean="0"/>
-              <a:t>PointCloud</a:t>
-            </a:r>
-            <a:endParaRPr lang="fr-FR" dirty="0" smtClean="0"/>
-          </a:p>
-          <a:p>
-            <a:pPr lvl="1" eaLnBrk="1" fontAlgn="auto" hangingPunct="1">
-              <a:spcAft>
-                <a:spcPts val="0"/>
-              </a:spcAft>
-              <a:buFont typeface="Arial" pitchFamily="34" charset="0"/>
-              <a:buChar char="–"/>
-              <a:defRPr/>
-            </a:pPr>
-            <a:r>
-              <a:rPr lang="fr-FR" dirty="0" err="1" smtClean="0"/>
-              <a:t>_chargement</a:t>
-            </a:r>
-            <a:r>
-              <a:rPr lang="fr-FR" dirty="0" smtClean="0"/>
-              <a:t> rapide et parallèle</a:t>
-            </a:r>
-          </a:p>
-          <a:p>
-            <a:pPr lvl="1" eaLnBrk="1" fontAlgn="auto" hangingPunct="1">
-              <a:spcAft>
-                <a:spcPts val="0"/>
-              </a:spcAft>
-              <a:buFont typeface="Arial" pitchFamily="34" charset="0"/>
-              <a:buChar char="–"/>
-              <a:defRPr/>
-            </a:pPr>
-            <a:r>
-              <a:rPr lang="fr-FR" dirty="0" err="1" smtClean="0"/>
-              <a:t>_indexations</a:t>
-            </a:r>
-            <a:r>
-              <a:rPr lang="fr-FR" dirty="0" smtClean="0"/>
-              <a:t> et performances</a:t>
-            </a:r>
-          </a:p>
-          <a:p>
-            <a:pPr eaLnBrk="1" fontAlgn="auto" hangingPunct="1">
-              <a:spcAft>
-                <a:spcPts val="0"/>
-              </a:spcAft>
-              <a:buFont typeface="Arial" pitchFamily="34" charset="0"/>
-              <a:buChar char="•"/>
-              <a:defRPr/>
-            </a:pPr>
-            <a:r>
-              <a:rPr lang="fr-FR" dirty="0" smtClean="0"/>
-              <a:t>Visu : </a:t>
-            </a:r>
-          </a:p>
-          <a:p>
-            <a:pPr lvl="1" eaLnBrk="1" fontAlgn="auto" hangingPunct="1">
-              <a:spcAft>
-                <a:spcPts val="0"/>
-              </a:spcAft>
-              <a:buFont typeface="Arial" pitchFamily="34" charset="0"/>
-              <a:buChar char="–"/>
-              <a:defRPr/>
-            </a:pPr>
-            <a:r>
-              <a:rPr lang="fr-FR" dirty="0" err="1" smtClean="0"/>
-              <a:t>_visu</a:t>
-            </a:r>
-            <a:r>
-              <a:rPr lang="fr-FR" dirty="0" smtClean="0"/>
-              <a:t> 2D dans QGIS</a:t>
-            </a:r>
-          </a:p>
-          <a:p>
-            <a:pPr lvl="1" eaLnBrk="1" fontAlgn="auto" hangingPunct="1">
-              <a:spcAft>
-                <a:spcPts val="0"/>
-              </a:spcAft>
-              <a:buFont typeface="Arial" pitchFamily="34" charset="0"/>
-              <a:buChar char="–"/>
-              <a:defRPr/>
-            </a:pPr>
-            <a:r>
-              <a:rPr lang="fr-FR" dirty="0" err="1" smtClean="0"/>
-              <a:t>_visu</a:t>
-            </a:r>
-            <a:r>
-              <a:rPr lang="fr-FR" dirty="0" smtClean="0"/>
-              <a:t> 3D interactive dans </a:t>
-            </a:r>
-            <a:r>
-              <a:rPr lang="fr-FR" dirty="0" err="1" smtClean="0"/>
-              <a:t>ITowns</a:t>
-            </a:r>
-            <a:r>
-              <a:rPr lang="fr-FR" dirty="0" smtClean="0"/>
-              <a:t> </a:t>
-            </a:r>
-          </a:p>
-          <a:p>
-            <a:pPr eaLnBrk="1" fontAlgn="auto" hangingPunct="1">
-              <a:spcAft>
-                <a:spcPts val="0"/>
-              </a:spcAft>
-              <a:buFont typeface="Arial" pitchFamily="34" charset="0"/>
-              <a:buChar char="•"/>
-              <a:defRPr/>
-            </a:pPr>
-            <a:r>
-              <a:rPr lang="fr-FR" dirty="0" err="1" smtClean="0"/>
-              <a:t>_utilisation</a:t>
-            </a:r>
-            <a:r>
-              <a:rPr lang="fr-FR" dirty="0" smtClean="0"/>
-              <a:t> (une base de 0.6 milliard et une base de 5.8 milliards de points)</a:t>
-            </a:r>
-          </a:p>
-          <a:p>
-            <a:pPr lvl="1" eaLnBrk="1" fontAlgn="auto" hangingPunct="1">
-              <a:spcAft>
-                <a:spcPts val="0"/>
-              </a:spcAft>
-              <a:buFont typeface="Arial" pitchFamily="34" charset="0"/>
-              <a:buChar char="–"/>
-              <a:defRPr/>
-            </a:pPr>
-            <a:r>
-              <a:rPr lang="fr-FR" dirty="0" err="1" smtClean="0"/>
-              <a:t>_niveaux</a:t>
-            </a:r>
-            <a:r>
-              <a:rPr lang="fr-FR" dirty="0" smtClean="0"/>
-              <a:t> de détails (</a:t>
-            </a:r>
-            <a:r>
-              <a:rPr lang="fr-FR" dirty="0" err="1" smtClean="0"/>
-              <a:t>quadtree</a:t>
-            </a:r>
-            <a:r>
-              <a:rPr lang="fr-FR" dirty="0" smtClean="0"/>
-              <a:t>/</a:t>
-            </a:r>
-            <a:r>
-              <a:rPr lang="fr-FR" dirty="0" err="1" smtClean="0"/>
-              <a:t>octree</a:t>
-            </a:r>
-            <a:r>
-              <a:rPr lang="fr-FR" dirty="0" smtClean="0"/>
-              <a:t>)</a:t>
-            </a:r>
-          </a:p>
-          <a:p>
-            <a:pPr lvl="1" eaLnBrk="1" fontAlgn="auto" hangingPunct="1">
-              <a:spcAft>
-                <a:spcPts val="0"/>
-              </a:spcAft>
-              <a:buFont typeface="Arial" pitchFamily="34" charset="0"/>
-              <a:buChar char="–"/>
-              <a:defRPr/>
-            </a:pPr>
-            <a:r>
-              <a:rPr lang="fr-FR" dirty="0" err="1" smtClean="0"/>
-              <a:t>_analyse</a:t>
-            </a:r>
-            <a:r>
-              <a:rPr lang="fr-FR" dirty="0" smtClean="0"/>
-              <a:t> basique ( PL/R  ) </a:t>
-            </a:r>
-          </a:p>
-          <a:p>
-            <a:pPr lvl="1" eaLnBrk="1" fontAlgn="auto" hangingPunct="1">
-              <a:spcAft>
-                <a:spcPts val="0"/>
-              </a:spcAft>
-              <a:buFont typeface="Arial" pitchFamily="34" charset="0"/>
-              <a:buChar char="–"/>
-              <a:defRPr/>
-            </a:pPr>
-            <a:r>
-              <a:rPr lang="fr-FR" dirty="0" err="1" smtClean="0"/>
-              <a:t>Processing</a:t>
-            </a:r>
-            <a:r>
-              <a:rPr lang="fr-FR" dirty="0" smtClean="0"/>
-              <a:t>  Pl/python</a:t>
-            </a:r>
-          </a:p>
-          <a:p>
-            <a:pPr lvl="1" eaLnBrk="1" fontAlgn="auto" hangingPunct="1">
-              <a:spcAft>
-                <a:spcPts val="0"/>
-              </a:spcAft>
-              <a:buFont typeface="Arial" pitchFamily="34" charset="0"/>
-              <a:buChar char="–"/>
-              <a:defRPr/>
-            </a:pPr>
-            <a:r>
-              <a:rPr lang="fr-FR" dirty="0" err="1" smtClean="0"/>
-              <a:t>_conversion</a:t>
-            </a:r>
-            <a:r>
-              <a:rPr lang="fr-FR" dirty="0" smtClean="0"/>
-              <a:t> en raster &amp; traitements image basiques en base.</a:t>
-            </a:r>
-          </a:p>
-          <a:p>
-            <a:pPr eaLnBrk="1" fontAlgn="auto" hangingPunct="1">
-              <a:spcAft>
-                <a:spcPts val="0"/>
-              </a:spcAft>
-              <a:buFont typeface="Arial" pitchFamily="34" charset="0"/>
-              <a:buChar char="•"/>
-              <a:defRPr/>
-            </a:pPr>
-            <a:r>
-              <a:rPr lang="fr-FR" dirty="0" err="1" smtClean="0"/>
-              <a:t>_utilisation</a:t>
-            </a:r>
-            <a:r>
-              <a:rPr lang="fr-FR" dirty="0" smtClean="0"/>
-              <a:t> par un </a:t>
-            </a:r>
-            <a:r>
-              <a:rPr lang="fr-FR" dirty="0" err="1" smtClean="0"/>
-              <a:t>algo</a:t>
-            </a:r>
-            <a:r>
-              <a:rPr lang="fr-FR" dirty="0" smtClean="0"/>
-              <a:t> interactif de détection de bord de trottoir (+zoo </a:t>
-            </a:r>
-            <a:r>
-              <a:rPr lang="fr-FR" dirty="0" err="1" smtClean="0"/>
-              <a:t>project</a:t>
-            </a:r>
-            <a:r>
-              <a:rPr lang="fr-FR" dirty="0" smtClean="0"/>
-              <a:t>)</a:t>
-            </a:r>
-          </a:p>
-          <a:p>
-            <a:pPr eaLnBrk="1" fontAlgn="auto" hangingPunct="1">
-              <a:spcAft>
-                <a:spcPts val="0"/>
-              </a:spcAft>
-              <a:buFont typeface="Arial" pitchFamily="34" charset="0"/>
-              <a:buChar char="•"/>
-              <a:defRPr/>
-            </a:pPr>
-            <a:r>
-              <a:rPr lang="fr-FR" dirty="0" err="1" smtClean="0"/>
-              <a:t>_perspectives</a:t>
-            </a:r>
-            <a:endParaRPr lang="fr-FR" dirty="0" smtClean="0"/>
+          <a:bodyPr/>
+          <a:lstStyle/>
+          <a:p>
+            <a:endParaRPr lang="en-US"/>
           </a:p>
         </p:txBody>
       </p:sp>
@@ -12852,7 +12960,7 @@
       </p:grpSpPr>
       <p:sp>
         <p:nvSpPr>
-          <p:cNvPr id="4098" name="Titre 1"/>
+          <p:cNvPr id="3074" name="Titre 1"/>
           <p:cNvSpPr>
             <a:spLocks noGrp="1"/>
           </p:cNvSpPr>
@@ -12875,7 +12983,7 @@
       </p:sp>
       <p:sp>
         <p:nvSpPr>
-          <p:cNvPr id="4099" name="Espace réservé du contenu 2"/>
+          <p:cNvPr id="3" name="Espace réservé du contenu 2"/>
           <p:cNvSpPr>
             <a:spLocks noGrp="1"/>
           </p:cNvSpPr>
@@ -12885,21 +12993,317 @@
         </p:nvSpPr>
         <p:spPr/>
         <p:txBody>
-          <a:bodyPr/>
-          <a:lstStyle/>
-          <a:p>
-            <a:pPr eaLnBrk="1" hangingPunct="1"/>
-            <a:r>
-              <a:rPr lang="fr-FR" smtClean="0"/>
-              <a:t>LOD maison</a:t>
-            </a:r>
-          </a:p>
-          <a:p>
-            <a:pPr eaLnBrk="1" hangingPunct="1"/>
-            <a:r>
-              <a:rPr lang="fr-FR" smtClean="0"/>
-              <a:t>Index et filtrage</a:t>
-            </a:r>
+          <a:bodyPr rtlCol="0">
+            <a:normAutofit fontScale="62500" lnSpcReduction="20000"/>
+          </a:bodyPr>
+          <a:lstStyle/>
+          <a:p>
+            <a:pPr eaLnBrk="1" fontAlgn="auto" hangingPunct="1">
+              <a:spcAft>
+                <a:spcPts val="0"/>
+              </a:spcAft>
+              <a:buFont typeface="Arial" pitchFamily="34" charset="0"/>
+              <a:buChar char="•"/>
+              <a:defRPr/>
+            </a:pPr>
+            <a:r>
+              <a:rPr lang="fr-FR" dirty="0" err="1" smtClean="0"/>
+              <a:t>_introduction</a:t>
+            </a:r>
+            <a:r>
+              <a:rPr lang="fr-FR" dirty="0" smtClean="0"/>
+              <a:t> aux nuages de points &amp; les problématiques de ce genre de données</a:t>
+            </a:r>
+          </a:p>
+          <a:p>
+            <a:pPr eaLnBrk="1" fontAlgn="auto" hangingPunct="1">
+              <a:spcAft>
+                <a:spcPts val="0"/>
+              </a:spcAft>
+              <a:buFont typeface="Arial" pitchFamily="34" charset="0"/>
+              <a:buChar char="•"/>
+              <a:defRPr/>
+            </a:pPr>
+            <a:r>
+              <a:rPr lang="fr-FR" dirty="0" err="1" smtClean="0"/>
+              <a:t>_serveur</a:t>
+            </a:r>
+            <a:r>
+              <a:rPr lang="fr-FR" dirty="0" smtClean="0"/>
+              <a:t> de nuages de points :</a:t>
+            </a:r>
+          </a:p>
+          <a:p>
+            <a:pPr lvl="1" eaLnBrk="1" fontAlgn="auto" hangingPunct="1">
+              <a:spcAft>
+                <a:spcPts val="0"/>
+              </a:spcAft>
+              <a:buFont typeface="Arial" pitchFamily="34" charset="0"/>
+              <a:buChar char="–"/>
+              <a:defRPr/>
+            </a:pPr>
+            <a:r>
+              <a:rPr lang="fr-FR" dirty="0" err="1" smtClean="0"/>
+              <a:t>_stockage</a:t>
+            </a:r>
+            <a:r>
+              <a:rPr lang="fr-FR" dirty="0" smtClean="0"/>
+              <a:t> en base de données avec </a:t>
+            </a:r>
+            <a:r>
+              <a:rPr lang="fr-FR" dirty="0" err="1" smtClean="0"/>
+              <a:t>PointCloud</a:t>
+            </a:r>
+            <a:endParaRPr lang="fr-FR" dirty="0" smtClean="0"/>
+          </a:p>
+          <a:p>
+            <a:pPr lvl="1" eaLnBrk="1" fontAlgn="auto" hangingPunct="1">
+              <a:spcAft>
+                <a:spcPts val="0"/>
+              </a:spcAft>
+              <a:buFont typeface="Arial" pitchFamily="34" charset="0"/>
+              <a:buChar char="–"/>
+              <a:defRPr/>
+            </a:pPr>
+            <a:r>
+              <a:rPr lang="fr-FR" dirty="0" err="1" smtClean="0"/>
+              <a:t>_chargement</a:t>
+            </a:r>
+            <a:r>
+              <a:rPr lang="fr-FR" dirty="0" smtClean="0"/>
+              <a:t> rapide et parallèle</a:t>
+            </a:r>
+          </a:p>
+          <a:p>
+            <a:pPr lvl="1" eaLnBrk="1" fontAlgn="auto" hangingPunct="1">
+              <a:spcAft>
+                <a:spcPts val="0"/>
+              </a:spcAft>
+              <a:buFont typeface="Arial" pitchFamily="34" charset="0"/>
+              <a:buChar char="–"/>
+              <a:defRPr/>
+            </a:pPr>
+            <a:r>
+              <a:rPr lang="fr-FR" dirty="0" err="1" smtClean="0"/>
+              <a:t>_indexations</a:t>
+            </a:r>
+            <a:r>
+              <a:rPr lang="fr-FR" dirty="0" smtClean="0"/>
+              <a:t> et performances</a:t>
+            </a:r>
+          </a:p>
+          <a:p>
+            <a:pPr eaLnBrk="1" fontAlgn="auto" hangingPunct="1">
+              <a:spcAft>
+                <a:spcPts val="0"/>
+              </a:spcAft>
+              <a:buFont typeface="Arial" pitchFamily="34" charset="0"/>
+              <a:buChar char="•"/>
+              <a:defRPr/>
+            </a:pPr>
+            <a:r>
+              <a:rPr lang="fr-FR" dirty="0" smtClean="0"/>
+              <a:t>Visu : </a:t>
+            </a:r>
+          </a:p>
+          <a:p>
+            <a:pPr lvl="1" eaLnBrk="1" fontAlgn="auto" hangingPunct="1">
+              <a:spcAft>
+                <a:spcPts val="0"/>
+              </a:spcAft>
+              <a:buFont typeface="Arial" pitchFamily="34" charset="0"/>
+              <a:buChar char="–"/>
+              <a:defRPr/>
+            </a:pPr>
+            <a:r>
+              <a:rPr lang="fr-FR" dirty="0" err="1" smtClean="0"/>
+              <a:t>_visu</a:t>
+            </a:r>
+            <a:r>
+              <a:rPr lang="fr-FR" dirty="0" smtClean="0"/>
+              <a:t> 2D dans QGIS</a:t>
+            </a:r>
+          </a:p>
+          <a:p>
+            <a:pPr lvl="1" eaLnBrk="1" fontAlgn="auto" hangingPunct="1">
+              <a:spcAft>
+                <a:spcPts val="0"/>
+              </a:spcAft>
+              <a:buFont typeface="Arial" pitchFamily="34" charset="0"/>
+              <a:buChar char="–"/>
+              <a:defRPr/>
+            </a:pPr>
+            <a:r>
+              <a:rPr lang="fr-FR" dirty="0" err="1" smtClean="0"/>
+              <a:t>_visu</a:t>
+            </a:r>
+            <a:r>
+              <a:rPr lang="fr-FR" dirty="0" smtClean="0"/>
+              <a:t> 3D interactive dans </a:t>
+            </a:r>
+            <a:r>
+              <a:rPr lang="fr-FR" dirty="0" err="1" smtClean="0"/>
+              <a:t>ITowns</a:t>
+            </a:r>
+            <a:r>
+              <a:rPr lang="fr-FR" dirty="0" smtClean="0"/>
+              <a:t> </a:t>
+            </a:r>
+          </a:p>
+          <a:p>
+            <a:pPr eaLnBrk="1" fontAlgn="auto" hangingPunct="1">
+              <a:spcAft>
+                <a:spcPts val="0"/>
+              </a:spcAft>
+              <a:buFont typeface="Arial" pitchFamily="34" charset="0"/>
+              <a:buChar char="•"/>
+              <a:defRPr/>
+            </a:pPr>
+            <a:r>
+              <a:rPr lang="fr-FR" dirty="0" err="1" smtClean="0"/>
+              <a:t>_utilisation</a:t>
+            </a:r>
+            <a:r>
+              <a:rPr lang="fr-FR" dirty="0" smtClean="0"/>
+              <a:t> (une base de 0.6 milliard et une base de 5.8 milliards de points)</a:t>
+            </a:r>
+          </a:p>
+          <a:p>
+            <a:pPr lvl="1" eaLnBrk="1" fontAlgn="auto" hangingPunct="1">
+              <a:spcAft>
+                <a:spcPts val="0"/>
+              </a:spcAft>
+              <a:buFont typeface="Arial" pitchFamily="34" charset="0"/>
+              <a:buChar char="–"/>
+              <a:defRPr/>
+            </a:pPr>
+            <a:r>
+              <a:rPr lang="fr-FR" dirty="0" err="1" smtClean="0"/>
+              <a:t>_niveaux</a:t>
+            </a:r>
+            <a:r>
+              <a:rPr lang="fr-FR" dirty="0" smtClean="0"/>
+              <a:t> de détails (</a:t>
+            </a:r>
+            <a:r>
+              <a:rPr lang="fr-FR" dirty="0" err="1" smtClean="0"/>
+              <a:t>quadtree</a:t>
+            </a:r>
+            <a:r>
+              <a:rPr lang="fr-FR" dirty="0" smtClean="0"/>
+              <a:t>/</a:t>
+            </a:r>
+            <a:r>
+              <a:rPr lang="fr-FR" dirty="0" err="1" smtClean="0"/>
+              <a:t>octree</a:t>
+            </a:r>
+            <a:r>
+              <a:rPr lang="fr-FR" dirty="0" smtClean="0"/>
+              <a:t>)</a:t>
+            </a:r>
+          </a:p>
+          <a:p>
+            <a:pPr lvl="1" eaLnBrk="1" fontAlgn="auto" hangingPunct="1">
+              <a:spcAft>
+                <a:spcPts val="0"/>
+              </a:spcAft>
+              <a:buFont typeface="Arial" pitchFamily="34" charset="0"/>
+              <a:buChar char="–"/>
+              <a:defRPr/>
+            </a:pPr>
+            <a:r>
+              <a:rPr lang="fr-FR" dirty="0" err="1" smtClean="0"/>
+              <a:t>_analyse</a:t>
+            </a:r>
+            <a:r>
+              <a:rPr lang="fr-FR" dirty="0" smtClean="0"/>
+              <a:t> basique ( PL/R  ) </a:t>
+            </a:r>
+          </a:p>
+          <a:p>
+            <a:pPr lvl="1" eaLnBrk="1" fontAlgn="auto" hangingPunct="1">
+              <a:spcAft>
+                <a:spcPts val="0"/>
+              </a:spcAft>
+              <a:buFont typeface="Arial" pitchFamily="34" charset="0"/>
+              <a:buChar char="–"/>
+              <a:defRPr/>
+            </a:pPr>
+            <a:r>
+              <a:rPr lang="fr-FR" dirty="0" err="1" smtClean="0"/>
+              <a:t>Processing</a:t>
+            </a:r>
+            <a:r>
+              <a:rPr lang="fr-FR" dirty="0" smtClean="0"/>
+              <a:t>  Pl/python</a:t>
+            </a:r>
+          </a:p>
+          <a:p>
+            <a:pPr lvl="1" eaLnBrk="1" fontAlgn="auto" hangingPunct="1">
+              <a:spcAft>
+                <a:spcPts val="0"/>
+              </a:spcAft>
+              <a:buFont typeface="Arial" pitchFamily="34" charset="0"/>
+              <a:buChar char="–"/>
+              <a:defRPr/>
+            </a:pPr>
+            <a:r>
+              <a:rPr lang="fr-FR" dirty="0" err="1" smtClean="0"/>
+              <a:t>_conversion</a:t>
+            </a:r>
+            <a:r>
+              <a:rPr lang="fr-FR" dirty="0" smtClean="0"/>
+              <a:t> en raster &amp; traitements image basiques en base.</a:t>
+            </a:r>
+          </a:p>
+          <a:p>
+            <a:pPr eaLnBrk="1" fontAlgn="auto" hangingPunct="1">
+              <a:spcAft>
+                <a:spcPts val="0"/>
+              </a:spcAft>
+              <a:buFont typeface="Arial" pitchFamily="34" charset="0"/>
+              <a:buChar char="•"/>
+              <a:defRPr/>
+            </a:pPr>
+            <a:r>
+              <a:rPr lang="fr-FR" dirty="0" err="1" smtClean="0"/>
+              <a:t>_utilisation</a:t>
+            </a:r>
+            <a:r>
+              <a:rPr lang="fr-FR" dirty="0" smtClean="0"/>
+              <a:t> par un </a:t>
+            </a:r>
+            <a:r>
+              <a:rPr lang="fr-FR" dirty="0" err="1" smtClean="0"/>
+              <a:t>algo</a:t>
+            </a:r>
+            <a:r>
+              <a:rPr lang="fr-FR" dirty="0" smtClean="0"/>
+              <a:t> interactif de détection de bord de trottoir (+zoo </a:t>
+            </a:r>
+            <a:r>
+              <a:rPr lang="fr-FR" dirty="0" err="1" smtClean="0"/>
+              <a:t>project</a:t>
+            </a:r>
+            <a:r>
+              <a:rPr lang="fr-FR" dirty="0" smtClean="0"/>
+              <a:t>)</a:t>
+            </a:r>
+          </a:p>
+          <a:p>
+            <a:pPr eaLnBrk="1" fontAlgn="auto" hangingPunct="1">
+              <a:spcAft>
+                <a:spcPts val="0"/>
+              </a:spcAft>
+              <a:buFont typeface="Arial" pitchFamily="34" charset="0"/>
+              <a:buChar char="•"/>
+              <a:defRPr/>
+            </a:pPr>
+            <a:r>
+              <a:rPr lang="fr-FR" dirty="0" err="1" smtClean="0"/>
+              <a:t>_perspectives</a:t>
+            </a:r>
+            <a:endParaRPr lang="fr-FR" dirty="0" smtClean="0"/>
           </a:p>
         </p:txBody>
       </p:sp>
@@ -13102,7 +13506,7 @@
       </p:grpSpPr>
       <p:sp>
         <p:nvSpPr>
-          <p:cNvPr id="5122" name="Titre 1"/>
+          <p:cNvPr id="4098" name="Titre 1"/>
           <p:cNvSpPr>
             <a:spLocks noGrp="1"/>
           </p:cNvSpPr>
@@ -13118,14 +13522,14 @@
             <a:pPr eaLnBrk="1" hangingPunct="1"/>
             <a:r>
               <a:rPr lang="fr-FR" smtClean="0"/>
-              <a:t>Demo PLR</a:t>
-            </a:r>
-          </a:p>
-        </p:txBody>
-      </p:sp>
-      <p:sp>
-        <p:nvSpPr>
-          <p:cNvPr id="5123" name="Espace réservé du contenu 2"/>
+              <a:t>Demo postgres	</a:t>
+            </a:r>
+          </a:p>
+        </p:txBody>
+      </p:sp>
+      <p:sp>
+        <p:nvSpPr>
+          <p:cNvPr id="4099" name="Espace réservé du contenu 2"/>
           <p:cNvSpPr>
             <a:spLocks noGrp="1"/>
           </p:cNvSpPr>
@@ -13141,21 +13545,14 @@
             <a:pPr eaLnBrk="1" hangingPunct="1"/>
             <a:r>
               <a:rPr lang="fr-FR" smtClean="0"/>
-              <a:t>Analyse de correlation</a:t>
+              <a:t>LOD maison</a:t>
             </a:r>
           </a:p>
           <a:p>
             <a:pPr eaLnBrk="1" hangingPunct="1"/>
             <a:r>
               <a:rPr lang="fr-FR" smtClean="0"/>
-              <a:t>Spline fitting</a:t>
-            </a:r>
-          </a:p>
-          <a:p>
-            <a:pPr eaLnBrk="1" hangingPunct="1"/>
-            <a:r>
-              <a:rPr lang="fr-FR" smtClean="0"/>
-              <a:t>Clustering (espace eucl+reflectance)</a:t>
+              <a:t>Index et filtrage</a:t>
             </a:r>
           </a:p>
         </p:txBody>
@@ -13187,7 +13584,7 @@
       </p:grpSpPr>
       <p:sp>
         <p:nvSpPr>
-          <p:cNvPr id="6146" name="Titre 1"/>
+          <p:cNvPr id="5122" name="Titre 1"/>
           <p:cNvSpPr>
             <a:spLocks noGrp="1"/>
           </p:cNvSpPr>
@@ -13203,14 +13600,14 @@
             <a:pPr eaLnBrk="1" hangingPunct="1"/>
             <a:r>
               <a:rPr lang="fr-FR" smtClean="0"/>
-              <a:t>Demo python</a:t>
-            </a:r>
-          </a:p>
-        </p:txBody>
-      </p:sp>
-      <p:sp>
-        <p:nvSpPr>
-          <p:cNvPr id="6147" name="Espace réservé du contenu 2"/>
+              <a:t>Demo PLR</a:t>
+            </a:r>
+          </a:p>
+        </p:txBody>
+      </p:sp>
+      <p:sp>
+        <p:nvSpPr>
+          <p:cNvPr id="5123" name="Espace réservé du contenu 2"/>
           <p:cNvSpPr>
             <a:spLocks noGrp="1"/>
           </p:cNvSpPr>
@@ -13226,26 +13623,22 @@
             <a:pPr eaLnBrk="1" hangingPunct="1"/>
             <a:r>
               <a:rPr lang="fr-FR" smtClean="0"/>
-              <a:t>Icp</a:t>
+              <a:t>Analyse de correlation</a:t>
             </a:r>
           </a:p>
           <a:p>
             <a:pPr eaLnBrk="1" hangingPunct="1"/>
             <a:r>
               <a:rPr lang="fr-FR" smtClean="0"/>
-              <a:t>filtrage</a:t>
+              <a:t>Spline fitting</a:t>
             </a:r>
           </a:p>
           <a:p>
             <a:pPr eaLnBrk="1" hangingPunct="1"/>
             <a:r>
               <a:rPr lang="fr-FR" smtClean="0"/>
-              <a:t>Detection de plan</a:t>
-            </a:r>
-          </a:p>
-          <a:p>
-            <a:pPr eaLnBrk="1" hangingPunct="1"/>
-            <a:endParaRPr lang="fr-FR" smtClean="0"/>
+              <a:t>Clustering (espace eucl+reflectance)</a:t>
+            </a:r>
           </a:p>
         </p:txBody>
       </p:sp>
@@ -13276,7 +13669,7 @@
       </p:grpSpPr>
       <p:sp>
         <p:nvSpPr>
-          <p:cNvPr id="2" name="Titre 1"/>
+          <p:cNvPr id="6146" name="Titre 1"/>
           <p:cNvSpPr>
             <a:spLocks noGrp="1"/>
           </p:cNvSpPr>
@@ -13286,74 +13679,54 @@
         </p:nvSpPr>
         <p:spPr/>
         <p:txBody>
-          <a:bodyPr rtlCol="0">
-            <a:normAutofit fontScale="90000"/>
-          </a:bodyPr>
-          <a:lstStyle/>
-          <a:p>
-            <a:pPr eaLnBrk="1" fontAlgn="auto" hangingPunct="1">
-              <a:spcAft>
-                <a:spcPts val="0"/>
-              </a:spcAft>
-              <a:defRPr/>
-            </a:pPr>
-            <a:r>
-              <a:rPr lang="fr-FR" dirty="0" smtClean="0"/>
-              <a:t>Comparaison </a:t>
-            </a:r>
-            <a:r>
-              <a:rPr lang="fr-FR" dirty="0" err="1" smtClean="0"/>
-              <a:t>plpythonu</a:t>
-            </a:r>
-            <a:r>
-              <a:rPr lang="fr-FR" dirty="0" smtClean="0"/>
-              <a:t>/</a:t>
-            </a:r>
-            <a:r>
-              <a:rPr lang="fr-FR" dirty="0" err="1" smtClean="0"/>
-              <a:t>plr</a:t>
-            </a:r>
-            <a:r>
-              <a:rPr lang="fr-FR" dirty="0" smtClean="0"/>
-              <a:t> avec le package «  </a:t>
-            </a:r>
-            <a:r>
-              <a:rPr lang="fr-FR" dirty="0" err="1" smtClean="0"/>
-              <a:t>fastcluster</a:t>
-            </a:r>
+          <a:bodyPr/>
+          <a:lstStyle/>
+          <a:p>
+            <a:pPr eaLnBrk="1" hangingPunct="1"/>
             <a:r>
               <a:rPr lang="fr-FR" smtClean="0"/>
-              <a:t>»</a:t>
-            </a:r>
-            <a:endParaRPr lang="fr-FR" dirty="0" smtClean="0"/>
-          </a:p>
-        </p:txBody>
-      </p:sp>
-      <p:sp>
-        <p:nvSpPr>
-          <p:cNvPr id="3" name="Espace réservé du texte 2"/>
-          <p:cNvSpPr>
-            <a:spLocks noGrp="1"/>
-          </p:cNvSpPr>
-          <p:nvPr>
-            <p:ph type="body" idx="1"/>
+              <a:t>Demo python</a:t>
+            </a:r>
+          </a:p>
+        </p:txBody>
+      </p:sp>
+      <p:sp>
+        <p:nvSpPr>
+          <p:cNvPr id="6147" name="Espace réservé du contenu 2"/>
+          <p:cNvSpPr>
+            <a:spLocks noGrp="1"/>
+          </p:cNvSpPr>
+          <p:nvPr>
+            <p:ph idx="1"/>
           </p:nvPr>
         </p:nvSpPr>
         <p:spPr/>
         <p:txBody>
-          <a:bodyPr rtlCol="0">
-            <a:normAutofit/>
-          </a:bodyPr>
-          <a:lstStyle/>
-          <a:p>
-            <a:pPr eaLnBrk="1" fontAlgn="auto" hangingPunct="1">
-              <a:spcAft>
-                <a:spcPts val="0"/>
-              </a:spcAft>
-              <a:buFont typeface="Arial" pitchFamily="34" charset="0"/>
-              <a:buNone/>
-              <a:defRPr/>
-            </a:pPr>
+          <a:bodyPr/>
+          <a:lstStyle/>
+          <a:p>
+            <a:pPr eaLnBrk="1" hangingPunct="1"/>
+            <a:r>
+              <a:rPr lang="fr-FR" smtClean="0"/>
+              <a:t>Icp</a:t>
+            </a:r>
+          </a:p>
+          <a:p>
+            <a:pPr eaLnBrk="1" hangingPunct="1"/>
+            <a:r>
+              <a:rPr lang="fr-FR" smtClean="0"/>
+              <a:t>filtrage</a:t>
+            </a:r>
+          </a:p>
+          <a:p>
+            <a:pPr eaLnBrk="1" hangingPunct="1"/>
+            <a:r>
+              <a:rPr lang="fr-FR" smtClean="0"/>
+              <a:t>Detection de plan</a:t>
+            </a:r>
+          </a:p>
+          <a:p>
+            <a:pPr eaLnBrk="1" hangingPunct="1"/>
             <a:endParaRPr lang="fr-FR" smtClean="0"/>
           </a:p>
         </p:txBody>
@@ -13385,42 +13758,67 @@
       </p:grpSpPr>
       <p:sp>
         <p:nvSpPr>
-          <p:cNvPr id="8194" name="Titre 1"/>
-          <p:cNvSpPr>
-            <a:spLocks noGrp="1"/>
-          </p:cNvSpPr>
-          <p:nvPr>
-            <p:ph type="ctrTitle"/>
+          <p:cNvPr id="2" name="Titre 1"/>
+          <p:cNvSpPr>
+            <a:spLocks noGrp="1"/>
+          </p:cNvSpPr>
+          <p:nvPr>
+            <p:ph type="title"/>
           </p:nvPr>
         </p:nvSpPr>
         <p:spPr/>
         <p:txBody>
-          <a:bodyPr/>
-          <a:lstStyle/>
-          <a:p>
-            <a:pPr eaLnBrk="1" hangingPunct="1"/>
+          <a:bodyPr rtlCol="0">
+            <a:normAutofit fontScale="90000"/>
+          </a:bodyPr>
+          <a:lstStyle/>
+          <a:p>
+            <a:pPr eaLnBrk="1" fontAlgn="auto" hangingPunct="1">
+              <a:spcAft>
+                <a:spcPts val="0"/>
+              </a:spcAft>
+              <a:defRPr/>
+            </a:pPr>
+            <a:r>
+              <a:rPr lang="fr-FR" dirty="0" smtClean="0"/>
+              <a:t>Comparaison </a:t>
+            </a:r>
+            <a:r>
+              <a:rPr lang="fr-FR" dirty="0" err="1" smtClean="0"/>
+              <a:t>plpythonu</a:t>
+            </a:r>
+            <a:r>
+              <a:rPr lang="fr-FR" dirty="0" smtClean="0"/>
+              <a:t>/</a:t>
+            </a:r>
+            <a:r>
+              <a:rPr lang="fr-FR" dirty="0" err="1" smtClean="0"/>
+              <a:t>plr</a:t>
+            </a:r>
+            <a:r>
+              <a:rPr lang="fr-FR" dirty="0" smtClean="0"/>
+              <a:t> avec le package «  </a:t>
+            </a:r>
+            <a:r>
+              <a:rPr lang="fr-FR" dirty="0" err="1" smtClean="0"/>
+              <a:t>fastcluster</a:t>
+            </a:r>
             <a:r>
               <a:rPr lang="fr-FR" smtClean="0"/>
-              <a:t>vtk </a:t>
-            </a:r>
-            <a:br>
-              <a:rPr lang="fr-FR" smtClean="0"/>
-            </a:br>
-            <a:r>
-              <a:rPr lang="fr-FR" smtClean="0"/>
-              <a:t> Icp</a:t>
-            </a:r>
-          </a:p>
-        </p:txBody>
-      </p:sp>
-      <p:sp>
-        <p:nvSpPr>
-          <p:cNvPr id="3" name="Sous-titre 2"/>
-          <p:cNvSpPr>
-            <a:spLocks noGrp="1"/>
-          </p:cNvSpPr>
-          <p:nvPr>
-            <p:ph type="subTitle" idx="1"/>
+              <a:t>»</a:t>
+            </a:r>
+            <a:endParaRPr lang="fr-FR" dirty="0" smtClean="0"/>
+          </a:p>
+        </p:txBody>
+      </p:sp>
+      <p:sp>
+        <p:nvSpPr>
+          <p:cNvPr id="3" name="Espace réservé du texte 2"/>
+          <p:cNvSpPr>
+            <a:spLocks noGrp="1"/>
+          </p:cNvSpPr>
+          <p:nvPr>
+            <p:ph type="body" idx="1"/>
           </p:nvPr>
         </p:nvSpPr>
         <p:spPr/>
@@ -13438,10 +13836,7 @@
               <a:buNone/>
               <a:defRPr/>
             </a:pPr>
-            <a:r>
-              <a:rPr lang="fr-FR" dirty="0" smtClean="0"/>
-              <a:t>http://www.vtk.org/Wiki/VTK/Examples/Python/IterativeClosestPoints</a:t>
-            </a:r>
+            <a:endParaRPr lang="fr-FR" smtClean="0"/>
           </a:p>
         </p:txBody>
       </p:sp>
@@ -13472,7 +13867,7 @@
       </p:grpSpPr>
       <p:sp>
         <p:nvSpPr>
-          <p:cNvPr id="2" name="Titre 1"/>
+          <p:cNvPr id="8194" name="Titre 1"/>
           <p:cNvSpPr>
             <a:spLocks noGrp="1"/>
           </p:cNvSpPr>
@@ -13480,49 +13875,22 @@
             <p:ph type="ctrTitle"/>
           </p:nvPr>
         </p:nvSpPr>
-        <p:spPr>
-          <a:xfrm>
-            <a:off x="685800" y="1785938"/>
-            <a:ext cx="7772400" cy="1814512"/>
-          </a:xfrm>
-        </p:spPr>
-        <p:txBody>
-          <a:bodyPr rtlCol="0">
-            <a:normAutofit/>
-          </a:bodyPr>
-          <a:lstStyle/>
-          <a:p>
-            <a:pPr eaLnBrk="1" fontAlgn="auto" hangingPunct="1">
-              <a:spcAft>
-                <a:spcPts val="0"/>
-              </a:spcAft>
-              <a:defRPr/>
-            </a:pPr>
-            <a:r>
-              <a:rPr lang="fr-FR" dirty="0" smtClean="0"/>
-              <a:t>PCL :</a:t>
+        <p:spPr/>
+        <p:txBody>
+          <a:bodyPr/>
+          <a:lstStyle/>
+          <a:p>
+            <a:pPr eaLnBrk="1" hangingPunct="1"/>
+            <a:r>
+              <a:rPr lang="fr-FR" smtClean="0"/>
+              <a:t>vtk </a:t>
             </a:r>
             <a:br>
-              <a:rPr lang="fr-FR" dirty="0" smtClean="0"/>
+              <a:rPr lang="fr-FR" smtClean="0"/>
             </a:br>
             <a:r>
-              <a:rPr lang="fr-FR" dirty="0" smtClean="0"/>
-              <a:t> </a:t>
-            </a:r>
-            <a:r>
-              <a:rPr lang="fr-FR" dirty="0" err="1" smtClean="0"/>
-              <a:t>Detection</a:t>
-            </a:r>
-            <a:r>
-              <a:rPr lang="fr-FR" dirty="0" smtClean="0"/>
-              <a:t> de plans</a:t>
-            </a:r>
-            <a:br>
-              <a:rPr lang="fr-FR" dirty="0" smtClean="0"/>
-            </a:br>
-            <a:r>
-              <a:rPr lang="fr-FR" dirty="0" smtClean="0"/>
-              <a:t>filtrage</a:t>
+              <a:rPr lang="fr-FR" smtClean="0"/>
+              <a:t> Icp</a:t>
             </a:r>
           </a:p>
         </p:txBody>
@@ -13553,25 +13921,8 @@
               <a:defRPr/>
             </a:pPr>
             <a:r>
-              <a:rPr lang="fr-FR" dirty="0" smtClean="0">
-                <a:hlinkClick r:id="rId2"/>
-              </a:rPr>
-              <a:t>https://github.com/strawlab/python-pcl/blob/master/tests/test.py</a:t>
-            </a:r>
-            <a:endParaRPr lang="fr-FR" dirty="0" smtClean="0"/>
-          </a:p>
-          <a:p>
-            <a:pPr eaLnBrk="1" fontAlgn="auto" hangingPunct="1">
-              <a:spcAft>
-                <a:spcPts val="0"/>
-              </a:spcAft>
-              <a:buFont typeface="Arial" pitchFamily="34" charset="0"/>
-              <a:buNone/>
-              <a:defRPr/>
-            </a:pPr>
-            <a:r>
               <a:rPr lang="fr-FR" dirty="0" smtClean="0"/>
-              <a:t>https://github.com/strawlab/python-pcl/</a:t>
+              <a:t>http://www.vtk.org/Wiki/VTK/Examples/Python/IterativeClosestPoints</a:t>
             </a:r>
           </a:p>
         </p:txBody>
@@ -13603,35 +13954,69 @@
       </p:grpSpPr>
       <p:sp>
         <p:nvSpPr>
-          <p:cNvPr id="10242" name="Titre 1"/>
-          <p:cNvSpPr>
-            <a:spLocks noGrp="1"/>
-          </p:cNvSpPr>
-          <p:nvPr>
-            <p:ph type="title"/>
-          </p:nvPr>
-        </p:nvSpPr>
-        <p:spPr/>
-        <p:txBody>
-          <a:bodyPr/>
-          <a:lstStyle/>
-          <a:p>
-            <a:pPr eaLnBrk="1" hangingPunct="1"/>
-            <a:r>
-              <a:rPr lang="fr-FR" smtClean="0"/>
-              <a:t>Conversion en raster </a:t>
-            </a:r>
-          </a:p>
-        </p:txBody>
-      </p:sp>
-      <p:sp>
-        <p:nvSpPr>
-          <p:cNvPr id="3" name="Espace réservé du contenu 2"/>
-          <p:cNvSpPr>
-            <a:spLocks noGrp="1"/>
-          </p:cNvSpPr>
-          <p:nvPr>
-            <p:ph idx="1"/>
+          <p:cNvPr id="2" name="Titre 1"/>
+          <p:cNvSpPr>
+            <a:spLocks noGrp="1"/>
+          </p:cNvSpPr>
+          <p:nvPr>
+            <p:ph type="ctrTitle"/>
+          </p:nvPr>
+        </p:nvSpPr>
+        <p:spPr>
+          <a:xfrm>
+            <a:off x="685800" y="1785938"/>
+            <a:ext cx="7772400" cy="1814512"/>
+          </a:xfrm>
+        </p:spPr>
+        <p:txBody>
+          <a:bodyPr rtlCol="0">
+            <a:normAutofit/>
+          </a:bodyPr>
+          <a:lstStyle/>
+          <a:p>
+            <a:pPr eaLnBrk="1" fontAlgn="auto" hangingPunct="1">
+              <a:spcAft>
+                <a:spcPts val="0"/>
+              </a:spcAft>
+              <a:defRPr/>
+            </a:pPr>
+            <a:r>
+              <a:rPr lang="fr-FR" dirty="0" smtClean="0"/>
+              <a:t>PCL :</a:t>
+            </a:r>
+            <a:br>
+              <a:rPr lang="fr-FR" dirty="0" smtClean="0"/>
+            </a:br>
+            <a:r>
+              <a:rPr lang="fr-FR" dirty="0" smtClean="0"/>
+              <a:t> </a:t>
+            </a:r>
+            <a:r>
+              <a:rPr lang="fr-FR" dirty="0" err="1" smtClean="0"/>
+              <a:t>Detection</a:t>
+            </a:r>
+            <a:r>
+              <a:rPr lang="fr-FR" dirty="0" smtClean="0"/>
+              <a:t> de plans</a:t>
+            </a:r>
+            <a:br>
+              <a:rPr lang="fr-FR" dirty="0" smtClean="0"/>
+            </a:br>
+            <a:r>
+              <a:rPr lang="fr-FR" dirty="0" smtClean="0"/>
+              <a:t>filtrage</a:t>
+            </a:r>
+          </a:p>
+        </p:txBody>
+      </p:sp>
+      <p:sp>
+        <p:nvSpPr>
+          <p:cNvPr id="3" name="Sous-titre 2"/>
+          <p:cNvSpPr>
+            <a:spLocks noGrp="1"/>
+          </p:cNvSpPr>
+          <p:nvPr>
+            <p:ph type="subTitle" idx="1"/>
           </p:nvPr>
         </p:nvSpPr>
         <p:spPr/>
@@ -13646,24 +14031,14 @@
                 <a:spcPts val="0"/>
               </a:spcAft>
               <a:buFont typeface="Arial" pitchFamily="34" charset="0"/>
-              <a:buChar char="•"/>
-              <a:defRPr/>
-            </a:pPr>
-            <a:r>
-              <a:rPr lang="fr-FR" dirty="0" smtClean="0"/>
-              <a:t>Cuisine perso + trick pour </a:t>
-            </a:r>
-            <a:r>
-              <a:rPr lang="fr-FR" dirty="0" err="1" smtClean="0"/>
-              <a:t>ecrire</a:t>
-            </a:r>
-            <a:r>
-              <a:rPr lang="fr-FR" dirty="0" smtClean="0"/>
-              <a:t> les fichiers </a:t>
-            </a:r>
-            <a:r>
-              <a:rPr lang="fr-FR" dirty="0" err="1" smtClean="0"/>
-              <a:t>rapidemment</a:t>
+              <a:buNone/>
+              <a:defRPr/>
+            </a:pPr>
+            <a:r>
+              <a:rPr lang="fr-FR" dirty="0" smtClean="0">
+                <a:hlinkClick r:id="rId2"/>
+              </a:rPr>
+              <a:t>https://github.com/strawlab/python-pcl/blob/master/tests/test.py</a:t>
             </a:r>
             <a:endParaRPr lang="fr-FR" dirty="0" smtClean="0"/>
           </a:p>
@@ -13673,134 +14048,13 @@
                 <a:spcPts val="0"/>
               </a:spcAft>
               <a:buFont typeface="Arial" pitchFamily="34" charset="0"/>
-              <a:buChar char="•"/>
+              <a:buNone/>
               <a:defRPr/>
             </a:pPr>
             <a:r>
               <a:rPr lang="fr-FR" dirty="0" smtClean="0"/>
-              <a:t>Filtrage </a:t>
-            </a:r>
-          </a:p>
-          <a:p>
-            <a:pPr eaLnBrk="1" fontAlgn="auto" hangingPunct="1">
-              <a:spcAft>
-                <a:spcPts val="0"/>
-              </a:spcAft>
-              <a:buFont typeface="Arial" pitchFamily="34" charset="0"/>
-              <a:buChar char="•"/>
-              <a:defRPr/>
-            </a:pPr>
-            <a:r>
-              <a:rPr lang="fr-FR" dirty="0" err="1" smtClean="0"/>
-              <a:t>Opencv</a:t>
-            </a:r>
-            <a:endParaRPr lang="fr-FR" dirty="0" smtClean="0"/>
-          </a:p>
-          <a:p>
-            <a:pPr lvl="1" eaLnBrk="1" fontAlgn="auto" hangingPunct="1">
-              <a:spcAft>
-                <a:spcPts val="0"/>
-              </a:spcAft>
-              <a:buFont typeface="Arial" pitchFamily="34" charset="0"/>
-              <a:buChar char="–"/>
-              <a:defRPr/>
-            </a:pPr>
-            <a:r>
-              <a:rPr lang="fr-FR" dirty="0" smtClean="0"/>
-              <a:t>Image basique</a:t>
-            </a:r>
-          </a:p>
-          <a:p>
-            <a:pPr lvl="1" eaLnBrk="1" fontAlgn="auto" hangingPunct="1">
-              <a:spcAft>
-                <a:spcPts val="0"/>
-              </a:spcAft>
-              <a:buFont typeface="Arial" pitchFamily="34" charset="0"/>
-              <a:buChar char="–"/>
-              <a:defRPr/>
-            </a:pPr>
-            <a:r>
-              <a:rPr lang="fr-FR" dirty="0" err="1" smtClean="0"/>
-              <a:t>Detection</a:t>
-            </a:r>
-            <a:r>
-              <a:rPr lang="fr-FR" dirty="0" smtClean="0"/>
-              <a:t> de cercle/lignes (</a:t>
-            </a:r>
-            <a:r>
-              <a:rPr lang="fr-FR" dirty="0" err="1" smtClean="0"/>
-              <a:t>hough</a:t>
-            </a:r>
-            <a:r>
-              <a:rPr lang="fr-FR" dirty="0" smtClean="0"/>
-              <a:t>)</a:t>
-            </a:r>
-          </a:p>
-          <a:p>
-            <a:pPr lvl="1" eaLnBrk="1" fontAlgn="auto" hangingPunct="1">
-              <a:spcAft>
-                <a:spcPts val="0"/>
-              </a:spcAft>
-              <a:buFont typeface="Arial" pitchFamily="34" charset="0"/>
-              <a:buChar char="–"/>
-              <a:defRPr/>
-            </a:pPr>
-            <a:r>
-              <a:rPr lang="fr-FR" dirty="0" err="1" smtClean="0"/>
-              <a:t>Detecteurs</a:t>
-            </a:r>
-            <a:endParaRPr lang="fr-FR" dirty="0" smtClean="0"/>
-          </a:p>
-          <a:p>
-            <a:pPr lvl="1" eaLnBrk="1" fontAlgn="auto" hangingPunct="1">
-              <a:spcAft>
-                <a:spcPts val="0"/>
-              </a:spcAft>
-              <a:buFont typeface="Arial" pitchFamily="34" charset="0"/>
-              <a:buChar char="–"/>
-              <a:defRPr/>
-            </a:pPr>
-            <a:r>
-              <a:rPr lang="fr-FR" dirty="0" err="1" smtClean="0"/>
-              <a:t>Matching</a:t>
-            </a:r>
-            <a:r>
-              <a:rPr lang="fr-FR" dirty="0" smtClean="0"/>
-              <a:t> pour trouver les marquages « </a:t>
-            </a:r>
-            <a:r>
-              <a:rPr lang="fr-FR" dirty="0" err="1" smtClean="0"/>
-              <a:t>velos</a:t>
-            </a:r>
-            <a:r>
-              <a:rPr lang="fr-FR" dirty="0" smtClean="0"/>
-              <a:t> »</a:t>
-            </a:r>
-          </a:p>
-          <a:p>
-            <a:pPr lvl="2" eaLnBrk="1" fontAlgn="auto" hangingPunct="1">
-              <a:spcAft>
-                <a:spcPts val="0"/>
-              </a:spcAft>
-              <a:buFont typeface="Arial" pitchFamily="34" charset="0"/>
-              <a:buChar char="•"/>
-              <a:defRPr/>
-            </a:pPr>
-            <a:r>
-              <a:rPr lang="fr-FR" dirty="0" smtClean="0"/>
-              <a:t>http://docs.opencv.org/trunk/doc/py_tutorials/py_feature2d/py_feature_homography/py_feature_homography.html#py-feature-homography</a:t>
-            </a:r>
-          </a:p>
-          <a:p>
-            <a:pPr eaLnBrk="1" fontAlgn="auto" hangingPunct="1">
-              <a:spcAft>
-                <a:spcPts val="0"/>
-              </a:spcAft>
-              <a:buFont typeface="Arial" pitchFamily="34" charset="0"/>
-              <a:buChar char="•"/>
-              <a:defRPr/>
-            </a:pPr>
-            <a:endParaRPr lang="fr-FR" dirty="0" smtClean="0"/>
+              <a:t>https://github.com/strawlab/python-pcl/</a:t>
+            </a:r>
           </a:p>
         </p:txBody>
       </p:sp>
@@ -13831,12 +14085,12 @@
       </p:grpSpPr>
       <p:sp>
         <p:nvSpPr>
-          <p:cNvPr id="11266" name="Titre 1"/>
-          <p:cNvSpPr>
-            <a:spLocks noGrp="1"/>
-          </p:cNvSpPr>
-          <p:nvPr>
-            <p:ph type="ctrTitle"/>
+          <p:cNvPr id="10242" name="Titre 1"/>
+          <p:cNvSpPr>
+            <a:spLocks noGrp="1"/>
+          </p:cNvSpPr>
+          <p:nvPr>
+            <p:ph type="title"/>
           </p:nvPr>
         </p:nvSpPr>
         <p:spPr/>
@@ -13847,19 +14101,19 @@
             <a:pPr eaLnBrk="1" hangingPunct="1"/>
             <a:r>
               <a:rPr lang="fr-FR" smtClean="0"/>
-              <a:t>Traitement d’image basique</a:t>
-            </a:r>
-          </a:p>
-        </p:txBody>
-      </p:sp>
-      <p:sp>
-        <p:nvSpPr>
-          <p:cNvPr id="3" name="Sous-titre 2"/>
-          <p:cNvSpPr>
-            <a:spLocks noGrp="1"/>
-          </p:cNvSpPr>
-          <p:nvPr>
-            <p:ph type="subTitle" idx="1"/>
+              <a:t>Conversion en raster </a:t>
+            </a:r>
+          </a:p>
+        </p:txBody>
+      </p:sp>
+      <p:sp>
+        <p:nvSpPr>
+          <p:cNvPr id="3" name="Espace réservé du contenu 2"/>
+          <p:cNvSpPr>
+            <a:spLocks noGrp="1"/>
+          </p:cNvSpPr>
+          <p:nvPr>
+            <p:ph idx="1"/>
           </p:nvPr>
         </p:nvSpPr>
         <p:spPr/>
@@ -13874,13 +14128,26 @@
                 <a:spcPts val="0"/>
               </a:spcAft>
               <a:buFont typeface="Arial" pitchFamily="34" charset="0"/>
-              <a:buNone/>
+              <a:buChar char="•"/>
               <a:defRPr/>
             </a:pPr>
             <a:r>
               <a:rPr lang="fr-FR" dirty="0" smtClean="0"/>
-              <a:t>http://docs.opencv.org/trunk/doc/py_tutorials/py_tutorials.html</a:t>
-            </a:r>
+              <a:t>Cuisine perso + trick pour </a:t>
+            </a:r>
+            <a:r>
+              <a:rPr lang="fr-FR" dirty="0" err="1" smtClean="0"/>
+              <a:t>ecrire</a:t>
+            </a:r>
+            <a:r>
+              <a:rPr lang="fr-FR" dirty="0" smtClean="0"/>
+              <a:t> les fichiers </a:t>
+            </a:r>
+            <a:r>
+              <a:rPr lang="fr-FR" dirty="0" err="1" smtClean="0"/>
+              <a:t>rapidemment</a:t>
+            </a:r>
+            <a:endParaRPr lang="fr-FR" dirty="0" smtClean="0"/>
           </a:p>
           <a:p>
             <a:pPr eaLnBrk="1" fontAlgn="auto" hangingPunct="1">
@@ -13888,25 +14155,133 @@
                 <a:spcPts val="0"/>
               </a:spcAft>
               <a:buFont typeface="Arial" pitchFamily="34" charset="0"/>
-              <a:buNone/>
+              <a:buChar char="•"/>
               <a:defRPr/>
             </a:pPr>
             <a:r>
               <a:rPr lang="fr-FR" dirty="0" smtClean="0"/>
-              <a:t>Gradient + </a:t>
-            </a:r>
+              <a:t>Filtrage </a:t>
+            </a:r>
+          </a:p>
+          <a:p>
+            <a:pPr eaLnBrk="1" fontAlgn="auto" hangingPunct="1">
+              <a:spcAft>
+                <a:spcPts val="0"/>
+              </a:spcAft>
+              <a:buFont typeface="Arial" pitchFamily="34" charset="0"/>
+              <a:buChar char="•"/>
+              <a:defRPr/>
+            </a:pPr>
+            <a:r>
+              <a:rPr lang="fr-FR" dirty="0" err="1" smtClean="0"/>
+              <a:t>Opencv</a:t>
+            </a:r>
+            <a:endParaRPr lang="fr-FR" dirty="0" smtClean="0"/>
+          </a:p>
+          <a:p>
+            <a:pPr lvl="1" eaLnBrk="1" fontAlgn="auto" hangingPunct="1">
+              <a:spcAft>
+                <a:spcPts val="0"/>
+              </a:spcAft>
+              <a:buFont typeface="Arial" pitchFamily="34" charset="0"/>
+              <a:buChar char="–"/>
+              <a:defRPr/>
+            </a:pPr>
+            <a:r>
+              <a:rPr lang="fr-FR" dirty="0" smtClean="0"/>
+              <a:t>Image basique</a:t>
+            </a:r>
+          </a:p>
+          <a:p>
+            <a:pPr lvl="1" eaLnBrk="1" fontAlgn="auto" hangingPunct="1">
+              <a:spcAft>
+                <a:spcPts val="0"/>
+              </a:spcAft>
+              <a:buFont typeface="Arial" pitchFamily="34" charset="0"/>
+              <a:buChar char="–"/>
+              <a:defRPr/>
+            </a:pPr>
             <a:r>
               <a:rPr lang="fr-FR" dirty="0" err="1" smtClean="0"/>
               <a:t>Detection</a:t>
             </a:r>
             <a:r>
               <a:rPr lang="fr-FR" dirty="0" smtClean="0"/>
-              <a:t> de cercle avec </a:t>
+              <a:t> de cercle/lignes (</a:t>
             </a:r>
             <a:r>
               <a:rPr lang="fr-FR" dirty="0" err="1" smtClean="0"/>
-              <a:t>OpenCV</a:t>
-            </a:r>
+              <a:t>hough</a:t>
+            </a:r>
+            <a:r>
+              <a:rPr lang="fr-FR" dirty="0" smtClean="0"/>
+              <a:t>)</a:t>
+            </a:r>
+          </a:p>
+          <a:p>
+            <a:pPr lvl="1" eaLnBrk="1" fontAlgn="auto" hangingPunct="1">
+              <a:spcAft>
+                <a:spcPts val="0"/>
+              </a:spcAft>
+              <a:buFont typeface="Arial" pitchFamily="34" charset="0"/>
+              <a:buChar char="–"/>
+              <a:defRPr/>
+            </a:pPr>
+            <a:r>
+              <a:rPr lang="fr-FR" dirty="0" err="1" smtClean="0"/>
+              <a:t>Detecteurs</a:t>
+            </a:r>
+            <a:endParaRPr lang="fr-FR" dirty="0" smtClean="0"/>
+          </a:p>
+          <a:p>
+            <a:pPr lvl="1" eaLnBrk="1" fontAlgn="auto" hangingPunct="1">
+              <a:spcAft>
+                <a:spcPts val="0"/>
+              </a:spcAft>
+              <a:buFont typeface="Arial" pitchFamily="34" charset="0"/>
+              <a:buChar char="–"/>
+              <a:defRPr/>
+            </a:pPr>
+            <a:r>
+              <a:rPr lang="fr-FR" dirty="0" err="1" smtClean="0"/>
+              <a:t>Matching</a:t>
+            </a:r>
+            <a:r>
+              <a:rPr lang="fr-FR" dirty="0" smtClean="0"/>
+              <a:t> pour trouver les marquages « </a:t>
+            </a:r>
+            <a:r>
+              <a:rPr lang="fr-FR" dirty="0" err="1" smtClean="0"/>
+              <a:t>velos</a:t>
+            </a:r>
+            <a:r>
+              <a:rPr lang="fr-FR" dirty="0" smtClean="0"/>
+              <a:t> »</a:t>
+            </a:r>
+          </a:p>
+          <a:p>
+            <a:pPr lvl="2" eaLnBrk="1" fontAlgn="auto" hangingPunct="1">
+              <a:spcAft>
+                <a:spcPts val="0"/>
+              </a:spcAft>
+              <a:buFont typeface="Arial" pitchFamily="34" charset="0"/>
+              <a:buChar char="•"/>
+              <a:defRPr/>
+            </a:pPr>
+            <a:r>
+              <a:rPr lang="fr-FR" dirty="0" smtClean="0"/>
+              <a:t>http://docs.opencv.org/trunk/doc/py_tutorials/py_feature2d/py_feature_homography/py_feature_homography.html#py-feature-homography</a:t>
+            </a:r>
+          </a:p>
+          <a:p>
+            <a:pPr eaLnBrk="1" fontAlgn="auto" hangingPunct="1">
+              <a:spcAft>
+                <a:spcPts val="0"/>
+              </a:spcAft>
+              <a:buFont typeface="Arial" pitchFamily="34" charset="0"/>
+              <a:buChar char="•"/>
+              <a:defRPr/>
+            </a:pPr>
             <a:endParaRPr lang="fr-FR" dirty="0" smtClean="0"/>
           </a:p>
         </p:txBody>
@@ -13938,7 +14313,7 @@
       </p:grpSpPr>
       <p:sp>
         <p:nvSpPr>
-          <p:cNvPr id="12290" name="Titre 1"/>
+          <p:cNvPr id="11266" name="Titre 1"/>
           <p:cNvSpPr>
             <a:spLocks noGrp="1"/>
           </p:cNvSpPr>
@@ -13954,7 +14329,7 @@
             <a:pPr eaLnBrk="1" hangingPunct="1"/>
             <a:r>
               <a:rPr lang="fr-FR" smtClean="0"/>
-              <a:t>avancé</a:t>
+              <a:t>Traitement d’image basique</a:t>
             </a:r>
           </a:p>
         </p:txBody>
@@ -13984,7 +14359,37 @@
               <a:buNone/>
               <a:defRPr/>
             </a:pPr>
-            <a:endParaRPr lang="fr-FR" smtClean="0"/>
+            <a:r>
+              <a:rPr lang="fr-FR" dirty="0" smtClean="0"/>
+              <a:t>http://docs.opencv.org/trunk/doc/py_tutorials/py_tutorials.html</a:t>
+            </a:r>
+          </a:p>
+          <a:p>
+            <a:pPr eaLnBrk="1" fontAlgn="auto" hangingPunct="1">
+              <a:spcAft>
+                <a:spcPts val="0"/>
+              </a:spcAft>
+              <a:buFont typeface="Arial" pitchFamily="34" charset="0"/>
+              <a:buNone/>
+              <a:defRPr/>
+            </a:pPr>
+            <a:r>
+              <a:rPr lang="fr-FR" dirty="0" smtClean="0"/>
+              <a:t>Gradient + </a:t>
+            </a:r>
+            <a:r>
+              <a:rPr lang="fr-FR" dirty="0" err="1" smtClean="0"/>
+              <a:t>Detection</a:t>
+            </a:r>
+            <a:r>
+              <a:rPr lang="fr-FR" dirty="0" smtClean="0"/>
+              <a:t> de cercle avec </a:t>
+            </a:r>
+            <a:r>
+              <a:rPr lang="fr-FR" dirty="0" err="1" smtClean="0"/>
+              <a:t>OpenCV</a:t>
+            </a:r>
+            <a:endParaRPr lang="fr-FR" dirty="0" smtClean="0"/>
           </a:p>
         </p:txBody>
       </p:sp>
@@ -14015,12 +14420,12 @@
       </p:grpSpPr>
       <p:sp>
         <p:nvSpPr>
-          <p:cNvPr id="13314" name="Titre 1"/>
-          <p:cNvSpPr>
-            <a:spLocks noGrp="1"/>
-          </p:cNvSpPr>
-          <p:nvPr>
-            <p:ph type="title"/>
+          <p:cNvPr id="12290" name="Titre 1"/>
+          <p:cNvSpPr>
+            <a:spLocks noGrp="1"/>
+          </p:cNvSpPr>
+          <p:nvPr>
+            <p:ph type="ctrTitle"/>
           </p:nvPr>
         </p:nvSpPr>
         <p:spPr/>
@@ -14031,31 +14436,37 @@
             <a:pPr eaLnBrk="1" hangingPunct="1"/>
             <a:r>
               <a:rPr lang="fr-FR" smtClean="0"/>
-              <a:t>24/06</a:t>
-            </a:r>
-          </a:p>
-        </p:txBody>
-      </p:sp>
-      <p:sp>
-        <p:nvSpPr>
-          <p:cNvPr id="13315" name="Espace réservé du contenu 2"/>
-          <p:cNvSpPr>
-            <a:spLocks noGrp="1"/>
-          </p:cNvSpPr>
-          <p:nvPr>
-            <p:ph idx="1"/>
+              <a:t>avancé</a:t>
+            </a:r>
+          </a:p>
+        </p:txBody>
+      </p:sp>
+      <p:sp>
+        <p:nvSpPr>
+          <p:cNvPr id="3" name="Sous-titre 2"/>
+          <p:cNvSpPr>
+            <a:spLocks noGrp="1"/>
+          </p:cNvSpPr>
+          <p:nvPr>
+            <p:ph type="subTitle" idx="1"/>
           </p:nvPr>
         </p:nvSpPr>
         <p:spPr/>
         <p:txBody>
-          <a:bodyPr/>
-          <a:lstStyle/>
-          <a:p>
-            <a:pPr eaLnBrk="1" hangingPunct="1"/>
-            <a:r>
-              <a:rPr lang="fr-FR" smtClean="0"/>
-              <a:t>Travail sur clustering dans R</a:t>
-            </a:r>
+          <a:bodyPr rtlCol="0">
+            <a:normAutofit/>
+          </a:bodyPr>
+          <a:lstStyle/>
+          <a:p>
+            <a:pPr eaLnBrk="1" fontAlgn="auto" hangingPunct="1">
+              <a:spcAft>
+                <a:spcPts val="0"/>
+              </a:spcAft>
+              <a:buFont typeface="Arial" pitchFamily="34" charset="0"/>
+              <a:buNone/>
+              <a:defRPr/>
+            </a:pPr>
+            <a:endParaRPr lang="fr-FR" smtClean="0"/>
           </a:p>
         </p:txBody>
       </p:sp>
@@ -14086,7 +14497,7 @@
       </p:grpSpPr>
       <p:sp>
         <p:nvSpPr>
-          <p:cNvPr id="14338" name="Titre 1"/>
+          <p:cNvPr id="13314" name="Titre 1"/>
           <p:cNvSpPr>
             <a:spLocks noGrp="1"/>
           </p:cNvSpPr>
@@ -14102,14 +14513,14 @@
             <a:pPr eaLnBrk="1" hangingPunct="1"/>
             <a:r>
               <a:rPr lang="fr-FR" smtClean="0"/>
-              <a:t>Loading data</a:t>
-            </a:r>
-          </a:p>
-        </p:txBody>
-      </p:sp>
-      <p:sp>
-        <p:nvSpPr>
-          <p:cNvPr id="14339" name="Espace réservé du contenu 2"/>
+              <a:t>24/06</a:t>
+            </a:r>
+          </a:p>
+        </p:txBody>
+      </p:sp>
+      <p:sp>
+        <p:nvSpPr>
+          <p:cNvPr id="13315" name="Espace réservé du contenu 2"/>
           <p:cNvSpPr>
             <a:spLocks noGrp="1"/>
           </p:cNvSpPr>
@@ -14125,28 +14536,7 @@
             <a:pPr eaLnBrk="1" hangingPunct="1"/>
             <a:r>
               <a:rPr lang="fr-FR" smtClean="0"/>
-              <a:t>Use the github project PointCloud_In_DB</a:t>
-            </a:r>
-          </a:p>
-          <a:p>
-            <a:pPr eaLnBrk="1" hangingPunct="1"/>
-            <a:r>
-              <a:rPr lang="fr-FR" smtClean="0"/>
-              <a:t>Get the data from IGN pointcloud benchmark</a:t>
-            </a:r>
-          </a:p>
-          <a:p>
-            <a:pPr eaLnBrk="1" hangingPunct="1"/>
-            <a:r>
-              <a:rPr lang="fr-FR" smtClean="0"/>
-              <a:t>Follow instruction of github project</a:t>
-            </a:r>
-          </a:p>
-          <a:p>
-            <a:pPr eaLnBrk="1" hangingPunct="1"/>
-            <a:r>
-              <a:rPr lang="fr-FR" smtClean="0"/>
-              <a:t>Install IGN spatial ref using the github project</a:t>
+              <a:t>Travail sur clustering dans R</a:t>
             </a:r>
           </a:p>
         </p:txBody>
@@ -14344,7 +14734,7 @@
       </p:grpSpPr>
       <p:sp>
         <p:nvSpPr>
-          <p:cNvPr id="15362" name="Titre 1"/>
+          <p:cNvPr id="14338" name="Titre 1"/>
           <p:cNvSpPr>
             <a:spLocks noGrp="1"/>
           </p:cNvSpPr>
@@ -14360,14 +14750,14 @@
             <a:pPr eaLnBrk="1" hangingPunct="1"/>
             <a:r>
               <a:rPr lang="fr-FR" smtClean="0"/>
-              <a:t>Patch To Raster</a:t>
-            </a:r>
-          </a:p>
-        </p:txBody>
-      </p:sp>
-      <p:sp>
-        <p:nvSpPr>
-          <p:cNvPr id="15363" name="Espace réservé du contenu 2"/>
+              <a:t>Loading data</a:t>
+            </a:r>
+          </a:p>
+        </p:txBody>
+      </p:sp>
+      <p:sp>
+        <p:nvSpPr>
+          <p:cNvPr id="14339" name="Espace réservé du contenu 2"/>
           <p:cNvSpPr>
             <a:spLocks noGrp="1"/>
           </p:cNvSpPr>
@@ -14383,53 +14773,28 @@
             <a:pPr eaLnBrk="1" hangingPunct="1"/>
             <a:r>
               <a:rPr lang="fr-FR" smtClean="0"/>
-              <a:t>Get the function from PPPP utilities</a:t>
+              <a:t>Use the github project PointCloud_In_DB</a:t>
             </a:r>
           </a:p>
           <a:p>
             <a:pPr eaLnBrk="1" hangingPunct="1"/>
             <a:r>
               <a:rPr lang="fr-FR" smtClean="0"/>
-              <a:t>Get rc_random_string</a:t>
+              <a:t>Get the data from IGN pointcloud benchmark</a:t>
             </a:r>
           </a:p>
           <a:p>
             <a:pPr eaLnBrk="1" hangingPunct="1"/>
             <a:r>
               <a:rPr lang="fr-FR" smtClean="0"/>
-              <a:t>rc_unnest_with_ordinality</a:t>
+              <a:t>Follow instruction of github project</a:t>
             </a:r>
           </a:p>
           <a:p>
             <a:pPr eaLnBrk="1" hangingPunct="1"/>
             <a:r>
               <a:rPr lang="fr-FR" smtClean="0"/>
-              <a:t>Array_agg_custom (array of array)</a:t>
-            </a:r>
-          </a:p>
-          <a:p>
-            <a:pPr eaLnBrk="1" hangingPunct="1"/>
-            <a:endParaRPr lang="fr-FR" smtClean="0"/>
-          </a:p>
-          <a:p>
-            <a:pPr eaLnBrk="1" hangingPunct="1"/>
-            <a:r>
-              <a:rPr lang="fr-FR" smtClean="0"/>
-              <a:t>Pour ecrire les raster qqpart :</a:t>
-            </a:r>
-          </a:p>
-          <a:p>
-            <a:pPr eaLnBrk="1" hangingPunct="1"/>
-            <a:r>
-              <a:rPr lang="fr-FR" smtClean="0"/>
-              <a:t>write_file_texte</a:t>
-            </a:r>
-          </a:p>
-          <a:p>
-            <a:pPr eaLnBrk="1" hangingPunct="1"/>
-            <a:r>
-              <a:rPr lang="fr-FR" smtClean="0"/>
-              <a:t>Activer les sorties pour les rasters : </a:t>
+              <a:t>Install IGN spatial ref using the github project</a:t>
             </a:r>
           </a:p>
         </p:txBody>
@@ -14461,7 +14826,7 @@
       </p:grpSpPr>
       <p:sp>
         <p:nvSpPr>
-          <p:cNvPr id="16386" name="Titre 1"/>
+          <p:cNvPr id="15362" name="Titre 1"/>
           <p:cNvSpPr>
             <a:spLocks noGrp="1"/>
           </p:cNvSpPr>
@@ -14484,7 +14849,7 @@
       </p:sp>
       <p:sp>
         <p:nvSpPr>
-          <p:cNvPr id="16387" name="Espace réservé du contenu 2"/>
+          <p:cNvPr id="15363" name="Espace réservé du contenu 2"/>
           <p:cNvSpPr>
             <a:spLocks noGrp="1"/>
           </p:cNvSpPr>
@@ -14522,6 +14887,31 @@
             <a:r>
               <a:rPr lang="fr-FR" smtClean="0"/>
               <a:t>Array_agg_custom (array of array)</a:t>
+            </a:r>
+          </a:p>
+          <a:p>
+            <a:pPr eaLnBrk="1" hangingPunct="1"/>
+            <a:endParaRPr lang="fr-FR" smtClean="0"/>
+          </a:p>
+          <a:p>
+            <a:pPr eaLnBrk="1" hangingPunct="1"/>
+            <a:r>
+              <a:rPr lang="fr-FR" smtClean="0"/>
+              <a:t>Pour ecrire les raster qqpart :</a:t>
+            </a:r>
+          </a:p>
+          <a:p>
+            <a:pPr eaLnBrk="1" hangingPunct="1"/>
+            <a:r>
+              <a:rPr lang="fr-FR" smtClean="0"/>
+              <a:t>write_file_texte</a:t>
+            </a:r>
+          </a:p>
+          <a:p>
+            <a:pPr eaLnBrk="1" hangingPunct="1"/>
+            <a:r>
+              <a:rPr lang="fr-FR" smtClean="0"/>
+              <a:t>Activer les sorties pour les rasters : </a:t>
             </a:r>
           </a:p>
         </p:txBody>
@@ -14553,7 +14943,7 @@
       </p:grpSpPr>
       <p:sp>
         <p:nvSpPr>
-          <p:cNvPr id="17410" name="Titre 1"/>
+          <p:cNvPr id="16386" name="Titre 1"/>
           <p:cNvSpPr>
             <a:spLocks noGrp="1"/>
           </p:cNvSpPr>
@@ -14563,114 +14953,58 @@
         </p:nvSpPr>
         <p:spPr/>
         <p:txBody>
-          <a:bodyPr>
-            <a:normAutofit fontScale="90000"/>
-          </a:bodyPr>
-          <a:lstStyle/>
-          <a:p>
+          <a:bodyPr/>
+          <a:lstStyle/>
+          <a:p>
+            <a:pPr eaLnBrk="1" hangingPunct="1"/>
             <a:r>
               <a:rPr lang="fr-FR" smtClean="0"/>
-              <a:t>Image processing : </a:t>
-            </a:r>
-            <a:br>
+              <a:t>Patch To Raster</a:t>
+            </a:r>
+          </a:p>
+        </p:txBody>
+      </p:sp>
+      <p:sp>
+        <p:nvSpPr>
+          <p:cNvPr id="16387" name="Espace réservé du contenu 2"/>
+          <p:cNvSpPr>
+            <a:spLocks noGrp="1"/>
+          </p:cNvSpPr>
+          <p:nvPr>
+            <p:ph idx="1"/>
+          </p:nvPr>
+        </p:nvSpPr>
+        <p:spPr/>
+        <p:txBody>
+          <a:bodyPr/>
+          <a:lstStyle/>
+          <a:p>
+            <a:pPr eaLnBrk="1" hangingPunct="1"/>
+            <a:r>
               <a:rPr lang="fr-FR" smtClean="0"/>
-            </a:br>
+              <a:t>Get the function from PPPP utilities</a:t>
+            </a:r>
+          </a:p>
+          <a:p>
+            <a:pPr eaLnBrk="1" hangingPunct="1"/>
             <a:r>
               <a:rPr lang="fr-FR" smtClean="0"/>
-              <a:t>building detection</a:t>
-            </a:r>
-          </a:p>
-        </p:txBody>
-      </p:sp>
-      <p:sp>
-        <p:nvSpPr>
-          <p:cNvPr id="17411" name="Espace réservé du contenu 2"/>
-          <p:cNvSpPr>
-            <a:spLocks noGrp="1"/>
-          </p:cNvSpPr>
-          <p:nvPr>
-            <p:ph idx="1"/>
-          </p:nvPr>
-        </p:nvSpPr>
-        <p:spPr/>
-        <p:txBody>
-          <a:bodyPr/>
-          <a:lstStyle/>
-          <a:p>
-            <a:r>
-              <a:rPr lang="fr-FR" sz="1400" smtClean="0"/>
-              <a:t>Need raster with pointcloud flattened, max height, pixel size = 10cm, + count of point/ pixel</a:t>
-            </a:r>
-          </a:p>
-          <a:p>
-            <a:r>
-              <a:rPr lang="fr-FR" sz="1400" smtClean="0"/>
-              <a:t>Use python script</a:t>
-            </a:r>
-          </a:p>
-          <a:p>
-            <a:pPr lvl="1"/>
-            <a:r>
-              <a:rPr lang="fr-FR" sz="1400" smtClean="0"/>
-              <a:t>Import tif</a:t>
-            </a:r>
-          </a:p>
-          <a:p>
-            <a:pPr lvl="1"/>
-            <a:r>
-              <a:rPr lang="fr-FR" sz="1400" smtClean="0"/>
-              <a:t>Keep only pixel that are above the laser</a:t>
-            </a:r>
-          </a:p>
-          <a:p>
-            <a:pPr lvl="1"/>
-            <a:r>
-              <a:rPr lang="fr-FR" sz="1400" smtClean="0"/>
-              <a:t>Keep only pixel that have more than 100 pts/pixel</a:t>
-            </a:r>
-          </a:p>
-          <a:p>
-            <a:pPr lvl="1"/>
-            <a:r>
-              <a:rPr lang="fr-FR" sz="1400" smtClean="0"/>
-              <a:t>Export tif</a:t>
-            </a:r>
-          </a:p>
-          <a:p>
-            <a:r>
-              <a:rPr lang="fr-FR" sz="1400" smtClean="0"/>
-              <a:t>Use sfcgal to consolidate lines</a:t>
-            </a:r>
-          </a:p>
-          <a:p>
-            <a:pPr lvl="1"/>
-            <a:r>
-              <a:rPr lang="fr-FR" sz="1400" smtClean="0"/>
-              <a:t>Execute sfcgal.sql to enable the sfcgal functions.</a:t>
-            </a:r>
-          </a:p>
-          <a:p>
-            <a:pPr lvl="1"/>
-            <a:r>
-              <a:rPr lang="fr-FR" sz="1400" smtClean="0"/>
-              <a:t>Execute code  : 120 sec, complex sql</a:t>
-            </a:r>
-          </a:p>
-          <a:p>
-            <a:r>
-              <a:rPr lang="fr-FR" sz="2200" smtClean="0"/>
-              <a:t>Use python to consolidate lines</a:t>
-            </a:r>
-          </a:p>
-          <a:p>
-            <a:pPr lvl="1"/>
-            <a:r>
-              <a:rPr lang="fr-FR" sz="1800" smtClean="0"/>
-              <a:t>1 sec , very few lines.</a:t>
-            </a:r>
-          </a:p>
-          <a:p>
-            <a:endParaRPr lang="fr-FR" sz="1800" smtClean="0"/>
+              <a:t>Get rc_random_string</a:t>
+            </a:r>
+          </a:p>
+          <a:p>
+            <a:pPr eaLnBrk="1" hangingPunct="1"/>
+            <a:r>
+              <a:rPr lang="fr-FR" smtClean="0"/>
+              <a:t>rc_unnest_with_ordinality</a:t>
+            </a:r>
+          </a:p>
+          <a:p>
+            <a:pPr eaLnBrk="1" hangingPunct="1"/>
+            <a:r>
+              <a:rPr lang="fr-FR" smtClean="0"/>
+              <a:t>Array_agg_custom (array of array)</a:t>
+            </a:r>
           </a:p>
         </p:txBody>
       </p:sp>
@@ -14701,7 +15035,7 @@
       </p:grpSpPr>
       <p:sp>
         <p:nvSpPr>
-          <p:cNvPr id="18434" name="Titre 1"/>
+          <p:cNvPr id="17410" name="Titre 1"/>
           <p:cNvSpPr>
             <a:spLocks noGrp="1"/>
           </p:cNvSpPr>
@@ -14725,14 +15059,14 @@
             </a:br>
             <a:r>
               <a:rPr lang="fr-FR" smtClean="0"/>
-              <a:t>sidewalk detection</a:t>
-            </a:r>
-          </a:p>
-        </p:txBody>
-      </p:sp>
-      <p:sp>
-        <p:nvSpPr>
-          <p:cNvPr id="18435" name="Espace réservé du contenu 2"/>
+              <a:t>building detection</a:t>
+            </a:r>
+          </a:p>
+        </p:txBody>
+      </p:sp>
+      <p:sp>
+        <p:nvSpPr>
+          <p:cNvPr id="17411" name="Espace réservé du contenu 2"/>
           <p:cNvSpPr>
             <a:spLocks noGrp="1"/>
           </p:cNvSpPr>
@@ -14747,7 +15081,7 @@
           <a:p>
             <a:r>
               <a:rPr lang="fr-FR" sz="1400" smtClean="0"/>
-              <a:t>Need raster with pointcloud flattened, min height, pixel size = 5cm, + count of point/ pixel</a:t>
+              <a:t>Need raster with pointcloud flattened, max height, pixel size = 10cm, + count of point/ pixel</a:t>
             </a:r>
           </a:p>
           <a:p>
@@ -14767,21 +15101,14 @@
             <a:pPr lvl="1"/>
             <a:r>
               <a:rPr lang="fr-FR" sz="1400" smtClean="0"/>
-              <a:t>Keep only pixel that are between -3 and -2 meters (relativ to laser (ground = -2.5meter))</a:t>
+              <a:t>Keep only pixel that are above the laser</a:t>
             </a:r>
           </a:p>
           <a:p>
             <a:pPr lvl="1"/>
             <a:r>
               <a:rPr lang="fr-FR" sz="1400" smtClean="0"/>
-              <a:t>Compute sobel filtering on Z ,using mask found before (nota : gives the local height variation)</a:t>
-            </a:r>
-          </a:p>
-          <a:p>
-            <a:pPr lvl="1"/>
-            <a:r>
-              <a:rPr lang="fr-FR" sz="1400" smtClean="0"/>
-              <a:t>Keep values between 1cm and 12 cm (official possible height)</a:t>
+              <a:t>Keep only pixel that have more than 100 pts/pixel</a:t>
             </a:r>
           </a:p>
           <a:p>
@@ -14789,6 +15116,39 @@
             <a:r>
               <a:rPr lang="fr-FR" sz="1400" smtClean="0"/>
               <a:t>Export tif</a:t>
+            </a:r>
+          </a:p>
+          <a:p>
+            <a:r>
+              <a:rPr lang="fr-FR" sz="1400" smtClean="0"/>
+              <a:t>Use sfcgal to consolidate lines</a:t>
+            </a:r>
+          </a:p>
+          <a:p>
+            <a:pPr lvl="1"/>
+            <a:r>
+              <a:rPr lang="fr-FR" sz="1400" smtClean="0"/>
+              <a:t>Execute sfcgal.sql to enable the sfcgal functions.</a:t>
+            </a:r>
+          </a:p>
+          <a:p>
+            <a:pPr lvl="1"/>
+            <a:r>
+              <a:rPr lang="fr-FR" sz="1400" smtClean="0"/>
+              <a:t>Execute code  : 120 sec, complex sql</a:t>
+            </a:r>
+          </a:p>
+          <a:p>
+            <a:r>
+              <a:rPr lang="fr-FR" sz="2200" smtClean="0"/>
+              <a:t>Use python to consolidate lines</a:t>
+            </a:r>
+          </a:p>
+          <a:p>
+            <a:pPr lvl="1"/>
+            <a:r>
+              <a:rPr lang="fr-FR" sz="1800" smtClean="0"/>
+              <a:t>1 sec , very few lines.</a:t>
             </a:r>
           </a:p>
           <a:p>
@@ -14805,6 +15165,128 @@
 </file>
 
 <file path=ppt/slides/slide44.xml><?xml version="1.0" encoding="utf-8"?>
+<p:sld xmlns:a="http://schemas.openxmlformats.org/drawingml/2006/main" xmlns:r="http://schemas.openxmlformats.org/officeDocument/2006/relationships" xmlns:p="http://schemas.openxmlformats.org/presentationml/2006/main">
+  <p:cSld>
+    <p:spTree>
+      <p:nvGrpSpPr>
+        <p:cNvPr id="1" name=""/>
+        <p:cNvGrpSpPr/>
+        <p:nvPr/>
+      </p:nvGrpSpPr>
+      <p:grpSpPr>
+        <a:xfrm>
+          <a:off x="0" y="0"/>
+          <a:ext cx="0" cy="0"/>
+          <a:chOff x="0" y="0"/>
+          <a:chExt cx="0" cy="0"/>
+        </a:xfrm>
+      </p:grpSpPr>
+      <p:sp>
+        <p:nvSpPr>
+          <p:cNvPr id="18434" name="Titre 1"/>
+          <p:cNvSpPr>
+            <a:spLocks noGrp="1"/>
+          </p:cNvSpPr>
+          <p:nvPr>
+            <p:ph type="title"/>
+          </p:nvPr>
+        </p:nvSpPr>
+        <p:spPr/>
+        <p:txBody>
+          <a:bodyPr>
+            <a:normAutofit fontScale="90000"/>
+          </a:bodyPr>
+          <a:lstStyle/>
+          <a:p>
+            <a:r>
+              <a:rPr lang="fr-FR" smtClean="0"/>
+              <a:t>Image processing : </a:t>
+            </a:r>
+            <a:br>
+              <a:rPr lang="fr-FR" smtClean="0"/>
+            </a:br>
+            <a:r>
+              <a:rPr lang="fr-FR" smtClean="0"/>
+              <a:t>sidewalk detection</a:t>
+            </a:r>
+          </a:p>
+        </p:txBody>
+      </p:sp>
+      <p:sp>
+        <p:nvSpPr>
+          <p:cNvPr id="18435" name="Espace réservé du contenu 2"/>
+          <p:cNvSpPr>
+            <a:spLocks noGrp="1"/>
+          </p:cNvSpPr>
+          <p:nvPr>
+            <p:ph idx="1"/>
+          </p:nvPr>
+        </p:nvSpPr>
+        <p:spPr/>
+        <p:txBody>
+          <a:bodyPr/>
+          <a:lstStyle/>
+          <a:p>
+            <a:r>
+              <a:rPr lang="fr-FR" sz="1400" smtClean="0"/>
+              <a:t>Need raster with pointcloud flattened, min height, pixel size = 5cm, + count of point/ pixel</a:t>
+            </a:r>
+          </a:p>
+          <a:p>
+            <a:r>
+              <a:rPr lang="fr-FR" sz="1400" smtClean="0"/>
+              <a:t>Use python script</a:t>
+            </a:r>
+          </a:p>
+          <a:p>
+            <a:pPr lvl="1"/>
+            <a:r>
+              <a:rPr lang="fr-FR" sz="1400" smtClean="0"/>
+              <a:t>Import tif</a:t>
+            </a:r>
+          </a:p>
+          <a:p>
+            <a:pPr lvl="1"/>
+            <a:r>
+              <a:rPr lang="fr-FR" sz="1400" smtClean="0"/>
+              <a:t>Keep only pixel that are between -3 and -2 meters (relativ to laser (ground = -2.5meter))</a:t>
+            </a:r>
+          </a:p>
+          <a:p>
+            <a:pPr lvl="1"/>
+            <a:r>
+              <a:rPr lang="fr-FR" sz="1400" smtClean="0"/>
+              <a:t>Compute sobel filtering on Z ,using mask found before (nota : gives the local height variation)</a:t>
+            </a:r>
+          </a:p>
+          <a:p>
+            <a:pPr lvl="1"/>
+            <a:r>
+              <a:rPr lang="fr-FR" sz="1400" smtClean="0"/>
+              <a:t>Keep values between 1cm and 12 cm (official possible height)</a:t>
+            </a:r>
+          </a:p>
+          <a:p>
+            <a:pPr lvl="1"/>
+            <a:r>
+              <a:rPr lang="fr-FR" sz="1400" smtClean="0"/>
+              <a:t>Export tif</a:t>
+            </a:r>
+          </a:p>
+          <a:p>
+            <a:endParaRPr lang="fr-FR" sz="1800" smtClean="0"/>
+          </a:p>
+        </p:txBody>
+      </p:sp>
+    </p:spTree>
+  </p:cSld>
+  <p:clrMapOvr>
+    <a:masterClrMapping/>
+  </p:clrMapOvr>
+</p:sld>
+</file>
+
+<file path=ppt/slides/slide45.xml><?xml version="1.0" encoding="utf-8"?>
 <p:sld xmlns:a="http://schemas.openxmlformats.org/drawingml/2006/main" xmlns:r="http://schemas.openxmlformats.org/officeDocument/2006/relationships" xmlns:p="http://schemas.openxmlformats.org/presentationml/2006/main">
   <p:cSld>
     <p:spTree>

</xml_diff>